<commit_message>
Slide Baru : Jupyter dan Seaborn
</commit_message>
<xml_diff>
--- a/Tugas 1/Basic Python.pptx
+++ b/Tugas 1/Basic Python.pptx
@@ -30,7 +30,16 @@
     <p:sldId id="279" r:id="rId24"/>
     <p:sldId id="280" r:id="rId25"/>
     <p:sldId id="281" r:id="rId26"/>
-    <p:sldId id="282" r:id="rId27"/>
+    <p:sldId id="290" r:id="rId27"/>
+    <p:sldId id="284" r:id="rId28"/>
+    <p:sldId id="285" r:id="rId29"/>
+    <p:sldId id="286" r:id="rId30"/>
+    <p:sldId id="287" r:id="rId31"/>
+    <p:sldId id="288" r:id="rId32"/>
+    <p:sldId id="291" r:id="rId33"/>
+    <p:sldId id="289" r:id="rId34"/>
+    <p:sldId id="292" r:id="rId35"/>
+    <p:sldId id="282" r:id="rId36"/>
   </p:sldIdLst>
   <p:sldSz cx="12192000" cy="6858000"/>
   <p:notesSz cx="6858000" cy="9144000"/>
@@ -590,7 +599,7 @@
           <a:p>
             <a:fld id="{047FADAB-D9AF-4329-9DA2-0DFFD2DB93CA}" type="datetimeFigureOut">
               <a:rPr lang="en-US" smtClean="0"/>
-              <a:t>3/23/2019</a:t>
+              <a:t>3/30/2019</a:t>
             </a:fld>
             <a:endParaRPr lang="en-US"/>
           </a:p>
@@ -922,7 +931,7 @@
           <a:p>
             <a:fld id="{047FADAB-D9AF-4329-9DA2-0DFFD2DB93CA}" type="datetimeFigureOut">
               <a:rPr lang="en-US" smtClean="0"/>
-              <a:t>3/23/2019</a:t>
+              <a:t>3/30/2019</a:t>
             </a:fld>
             <a:endParaRPr lang="en-US"/>
           </a:p>
@@ -1118,7 +1127,7 @@
           <a:p>
             <a:fld id="{047FADAB-D9AF-4329-9DA2-0DFFD2DB93CA}" type="datetimeFigureOut">
               <a:rPr lang="en-US" smtClean="0"/>
-              <a:t>3/23/2019</a:t>
+              <a:t>3/30/2019</a:t>
             </a:fld>
             <a:endParaRPr lang="en-US"/>
           </a:p>
@@ -1388,7 +1397,7 @@
           <a:p>
             <a:fld id="{047FADAB-D9AF-4329-9DA2-0DFFD2DB93CA}" type="datetimeFigureOut">
               <a:rPr lang="en-US" smtClean="0"/>
-              <a:t>3/23/2019</a:t>
+              <a:t>3/30/2019</a:t>
             </a:fld>
             <a:endParaRPr lang="en-US"/>
           </a:p>
@@ -1816,7 +1825,7 @@
           <a:p>
             <a:fld id="{047FADAB-D9AF-4329-9DA2-0DFFD2DB93CA}" type="datetimeFigureOut">
               <a:rPr lang="en-US" smtClean="0"/>
-              <a:t>3/23/2019</a:t>
+              <a:t>3/30/2019</a:t>
             </a:fld>
             <a:endParaRPr lang="en-US"/>
           </a:p>
@@ -2366,7 +2375,7 @@
           <a:p>
             <a:fld id="{047FADAB-D9AF-4329-9DA2-0DFFD2DB93CA}" type="datetimeFigureOut">
               <a:rPr lang="en-US" smtClean="0"/>
-              <a:t>3/23/2019</a:t>
+              <a:t>3/30/2019</a:t>
             </a:fld>
             <a:endParaRPr lang="en-US"/>
           </a:p>
@@ -3156,7 +3165,7 @@
           <a:p>
             <a:fld id="{047FADAB-D9AF-4329-9DA2-0DFFD2DB93CA}" type="datetimeFigureOut">
               <a:rPr lang="en-US" smtClean="0"/>
-              <a:t>3/23/2019</a:t>
+              <a:t>3/30/2019</a:t>
             </a:fld>
             <a:endParaRPr lang="en-US"/>
           </a:p>
@@ -3335,7 +3344,7 @@
           <a:p>
             <a:fld id="{047FADAB-D9AF-4329-9DA2-0DFFD2DB93CA}" type="datetimeFigureOut">
               <a:rPr lang="en-US" smtClean="0"/>
-              <a:t>3/23/2019</a:t>
+              <a:t>3/30/2019</a:t>
             </a:fld>
             <a:endParaRPr lang="en-US"/>
           </a:p>
@@ -3519,7 +3528,7 @@
           <a:p>
             <a:fld id="{047FADAB-D9AF-4329-9DA2-0DFFD2DB93CA}" type="datetimeFigureOut">
               <a:rPr lang="en-US" smtClean="0"/>
-              <a:t>3/23/2019</a:t>
+              <a:t>3/30/2019</a:t>
             </a:fld>
             <a:endParaRPr lang="en-US"/>
           </a:p>
@@ -3689,7 +3698,7 @@
           <a:p>
             <a:fld id="{047FADAB-D9AF-4329-9DA2-0DFFD2DB93CA}" type="datetimeFigureOut">
               <a:rPr lang="en-US" smtClean="0"/>
-              <a:t>3/23/2019</a:t>
+              <a:t>3/30/2019</a:t>
             </a:fld>
             <a:endParaRPr lang="en-US"/>
           </a:p>
@@ -3977,7 +3986,7 @@
           <a:p>
             <a:fld id="{047FADAB-D9AF-4329-9DA2-0DFFD2DB93CA}" type="datetimeFigureOut">
               <a:rPr lang="en-US" smtClean="0"/>
-              <a:t>3/23/2019</a:t>
+              <a:t>3/30/2019</a:t>
             </a:fld>
             <a:endParaRPr lang="en-US"/>
           </a:p>
@@ -4152,7 +4161,7 @@
           <a:p>
             <a:fld id="{047FADAB-D9AF-4329-9DA2-0DFFD2DB93CA}" type="datetimeFigureOut">
               <a:rPr lang="en-US" smtClean="0"/>
-              <a:t>3/23/2019</a:t>
+              <a:t>3/30/2019</a:t>
             </a:fld>
             <a:endParaRPr lang="en-US"/>
           </a:p>
@@ -4204,6 +4213,346 @@
     <p:extLst>
       <p:ext uri="{BB962C8B-B14F-4D97-AF65-F5344CB8AC3E}">
         <p14:creationId xmlns:p14="http://schemas.microsoft.com/office/powerpoint/2010/main" val="4155285101"/>
+      </p:ext>
+    </p:extLst>
+  </p:cSld>
+  <p:clrMapOvr>
+    <a:masterClrMapping/>
+  </p:clrMapOvr>
+</p:sldLayout>
+</file>
+
+<file path=ppt/slideLayouts/slideLayout20.xml><?xml version="1.0" encoding="utf-8"?>
+<p:sldLayout xmlns:a="http://schemas.openxmlformats.org/drawingml/2006/main" xmlns:r="http://schemas.openxmlformats.org/officeDocument/2006/relationships" xmlns:p="http://schemas.openxmlformats.org/presentationml/2006/main">
+  <p:cSld name="Judul dan Keterangan">
+    <p:spTree>
+      <p:nvGrpSpPr>
+        <p:cNvPr id="1" name=""/>
+        <p:cNvGrpSpPr/>
+        <p:nvPr/>
+      </p:nvGrpSpPr>
+      <p:grpSpPr>
+        <a:xfrm>
+          <a:off x="0" y="0"/>
+          <a:ext cx="0" cy="0"/>
+          <a:chOff x="0" y="0"/>
+          <a:chExt cx="0" cy="0"/>
+        </a:xfrm>
+      </p:grpSpPr>
+      <p:sp>
+        <p:nvSpPr>
+          <p:cNvPr id="2" name="Title 1"/>
+          <p:cNvSpPr>
+            <a:spLocks noGrp="1"/>
+          </p:cNvSpPr>
+          <p:nvPr>
+            <p:ph type="title"/>
+          </p:nvPr>
+        </p:nvSpPr>
+        <p:spPr>
+          <a:xfrm>
+            <a:off x="2589212" y="609600"/>
+            <a:ext cx="8915399" cy="3117040"/>
+          </a:xfrm>
+        </p:spPr>
+        <p:txBody>
+          <a:bodyPr anchor="ctr">
+            <a:normAutofit/>
+          </a:bodyPr>
+          <a:lstStyle>
+            <a:lvl1pPr algn="l">
+              <a:defRPr sz="4800" b="0" cap="none"/>
+            </a:lvl1pPr>
+          </a:lstStyle>
+          <a:p>
+            <a:r>
+              <a:rPr lang="id-ID"/>
+              <a:t>Klik untuk mengedit gaya judul Master</a:t>
+            </a:r>
+            <a:endParaRPr lang="en-US" dirty="0"/>
+          </a:p>
+        </p:txBody>
+      </p:sp>
+      <p:sp>
+        <p:nvSpPr>
+          <p:cNvPr id="3" name="Text Placeholder 2"/>
+          <p:cNvSpPr>
+            <a:spLocks noGrp="1"/>
+          </p:cNvSpPr>
+          <p:nvPr>
+            <p:ph type="body" idx="1"/>
+          </p:nvPr>
+        </p:nvSpPr>
+        <p:spPr>
+          <a:xfrm>
+            <a:off x="2589212" y="4354046"/>
+            <a:ext cx="8915399" cy="1555864"/>
+          </a:xfrm>
+        </p:spPr>
+        <p:txBody>
+          <a:bodyPr anchor="ctr">
+            <a:normAutofit/>
+          </a:bodyPr>
+          <a:lstStyle>
+            <a:lvl1pPr marL="0" indent="0" algn="l">
+              <a:buNone/>
+              <a:defRPr sz="1800">
+                <a:solidFill>
+                  <a:schemeClr val="tx1">
+                    <a:lumMod val="65000"/>
+                    <a:lumOff val="35000"/>
+                  </a:schemeClr>
+                </a:solidFill>
+              </a:defRPr>
+            </a:lvl1pPr>
+            <a:lvl2pPr marL="457200" indent="0">
+              <a:buNone/>
+              <a:defRPr sz="1800">
+                <a:solidFill>
+                  <a:schemeClr val="tx1">
+                    <a:tint val="75000"/>
+                  </a:schemeClr>
+                </a:solidFill>
+              </a:defRPr>
+            </a:lvl2pPr>
+            <a:lvl3pPr marL="914400" indent="0">
+              <a:buNone/>
+              <a:defRPr sz="1600">
+                <a:solidFill>
+                  <a:schemeClr val="tx1">
+                    <a:tint val="75000"/>
+                  </a:schemeClr>
+                </a:solidFill>
+              </a:defRPr>
+            </a:lvl3pPr>
+            <a:lvl4pPr marL="1371600" indent="0">
+              <a:buNone/>
+              <a:defRPr sz="1400">
+                <a:solidFill>
+                  <a:schemeClr val="tx1">
+                    <a:tint val="75000"/>
+                  </a:schemeClr>
+                </a:solidFill>
+              </a:defRPr>
+            </a:lvl4pPr>
+            <a:lvl5pPr marL="1828800" indent="0">
+              <a:buNone/>
+              <a:defRPr sz="1400">
+                <a:solidFill>
+                  <a:schemeClr val="tx1">
+                    <a:tint val="75000"/>
+                  </a:schemeClr>
+                </a:solidFill>
+              </a:defRPr>
+            </a:lvl5pPr>
+            <a:lvl6pPr marL="2286000" indent="0">
+              <a:buNone/>
+              <a:defRPr sz="1400">
+                <a:solidFill>
+                  <a:schemeClr val="tx1">
+                    <a:tint val="75000"/>
+                  </a:schemeClr>
+                </a:solidFill>
+              </a:defRPr>
+            </a:lvl6pPr>
+            <a:lvl7pPr marL="2743200" indent="0">
+              <a:buNone/>
+              <a:defRPr sz="1400">
+                <a:solidFill>
+                  <a:schemeClr val="tx1">
+                    <a:tint val="75000"/>
+                  </a:schemeClr>
+                </a:solidFill>
+              </a:defRPr>
+            </a:lvl7pPr>
+            <a:lvl8pPr marL="3200400" indent="0">
+              <a:buNone/>
+              <a:defRPr sz="1400">
+                <a:solidFill>
+                  <a:schemeClr val="tx1">
+                    <a:tint val="75000"/>
+                  </a:schemeClr>
+                </a:solidFill>
+              </a:defRPr>
+            </a:lvl8pPr>
+            <a:lvl9pPr marL="3657600" indent="0">
+              <a:buNone/>
+              <a:defRPr sz="1400">
+                <a:solidFill>
+                  <a:schemeClr val="tx1">
+                    <a:tint val="75000"/>
+                  </a:schemeClr>
+                </a:solidFill>
+              </a:defRPr>
+            </a:lvl9pPr>
+          </a:lstStyle>
+          <a:p>
+            <a:pPr lvl="0"/>
+            <a:r>
+              <a:rPr lang="id-ID"/>
+              <a:t>Klik untuk edit gaya teks Master</a:t>
+            </a:r>
+          </a:p>
+        </p:txBody>
+      </p:sp>
+      <p:sp>
+        <p:nvSpPr>
+          <p:cNvPr id="4" name="Date Placeholder 3"/>
+          <p:cNvSpPr>
+            <a:spLocks noGrp="1"/>
+          </p:cNvSpPr>
+          <p:nvPr>
+            <p:ph type="dt" sz="half" idx="10"/>
+          </p:nvPr>
+        </p:nvSpPr>
+        <p:spPr/>
+        <p:txBody>
+          <a:bodyPr/>
+          <a:lstStyle/>
+          <a:p>
+            <a:fld id="{B61BEF0D-F0BB-DE4B-95CE-6DB70DBA9567}" type="datetimeFigureOut">
+              <a:rPr lang="en-US" dirty="0"/>
+              <a:pPr/>
+              <a:t>3/30/2019</a:t>
+            </a:fld>
+            <a:endParaRPr lang="en-US" dirty="0"/>
+          </a:p>
+        </p:txBody>
+      </p:sp>
+      <p:sp>
+        <p:nvSpPr>
+          <p:cNvPr id="5" name="Footer Placeholder 4"/>
+          <p:cNvSpPr>
+            <a:spLocks noGrp="1"/>
+          </p:cNvSpPr>
+          <p:nvPr>
+            <p:ph type="ftr" sz="quarter" idx="11"/>
+          </p:nvPr>
+        </p:nvSpPr>
+        <p:spPr/>
+        <p:txBody>
+          <a:bodyPr/>
+          <a:lstStyle/>
+          <a:p>
+            <a:endParaRPr lang="en-US" dirty="0"/>
+          </a:p>
+        </p:txBody>
+      </p:sp>
+      <p:sp>
+        <p:nvSpPr>
+          <p:cNvPr id="9" name="Freeform 11"/>
+          <p:cNvSpPr/>
+          <p:nvPr/>
+        </p:nvSpPr>
+        <p:spPr bwMode="auto">
+          <a:xfrm flipV="1">
+            <a:off x="-4189" y="3178175"/>
+            <a:ext cx="1588527" cy="507297"/>
+          </a:xfrm>
+          <a:custGeom>
+            <a:avLst/>
+            <a:gdLst/>
+            <a:ahLst/>
+            <a:cxnLst/>
+            <a:rect l="l" t="t" r="r" b="b"/>
+            <a:pathLst>
+              <a:path w="9248" h="10000">
+                <a:moveTo>
+                  <a:pt x="9248" y="4701"/>
+                </a:moveTo>
+                <a:lnTo>
+                  <a:pt x="7915" y="188"/>
+                </a:lnTo>
+                <a:cubicBezTo>
+                  <a:pt x="7906" y="156"/>
+                  <a:pt x="7895" y="126"/>
+                  <a:pt x="7886" y="94"/>
+                </a:cubicBezTo>
+                <a:cubicBezTo>
+                  <a:pt x="7859" y="0"/>
+                  <a:pt x="7831" y="0"/>
+                  <a:pt x="7803" y="0"/>
+                </a:cubicBezTo>
+                <a:lnTo>
+                  <a:pt x="7275" y="0"/>
+                </a:lnTo>
+                <a:lnTo>
+                  <a:pt x="0" y="70"/>
+                </a:lnTo>
+                <a:cubicBezTo>
+                  <a:pt x="8" y="3380"/>
+                  <a:pt x="17" y="6690"/>
+                  <a:pt x="25" y="10000"/>
+                </a:cubicBezTo>
+                <a:lnTo>
+                  <a:pt x="7275" y="9966"/>
+                </a:lnTo>
+                <a:lnTo>
+                  <a:pt x="7803" y="9966"/>
+                </a:lnTo>
+                <a:cubicBezTo>
+                  <a:pt x="7831" y="9966"/>
+                  <a:pt x="7859" y="9872"/>
+                  <a:pt x="7886" y="9872"/>
+                </a:cubicBezTo>
+                <a:cubicBezTo>
+                  <a:pt x="7886" y="9778"/>
+                  <a:pt x="7915" y="9778"/>
+                  <a:pt x="7915" y="9778"/>
+                </a:cubicBezTo>
+                <a:lnTo>
+                  <a:pt x="9248" y="5265"/>
+                </a:lnTo>
+                <a:cubicBezTo>
+                  <a:pt x="9303" y="5077"/>
+                  <a:pt x="9303" y="4889"/>
+                  <a:pt x="9248" y="4701"/>
+                </a:cubicBezTo>
+                <a:close/>
+              </a:path>
+            </a:pathLst>
+          </a:custGeom>
+          <a:solidFill>
+            <a:schemeClr val="accent1"/>
+          </a:solidFill>
+          <a:ln>
+            <a:noFill/>
+          </a:ln>
+        </p:spPr>
+      </p:sp>
+      <p:sp>
+        <p:nvSpPr>
+          <p:cNvPr id="6" name="Slide Number Placeholder 5"/>
+          <p:cNvSpPr>
+            <a:spLocks noGrp="1"/>
+          </p:cNvSpPr>
+          <p:nvPr>
+            <p:ph type="sldNum" sz="quarter" idx="12"/>
+          </p:nvPr>
+        </p:nvSpPr>
+        <p:spPr>
+          <a:xfrm>
+            <a:off x="531812" y="3244139"/>
+            <a:ext cx="779767" cy="365125"/>
+          </a:xfrm>
+        </p:spPr>
+        <p:txBody>
+          <a:bodyPr/>
+          <a:lstStyle/>
+          <a:p>
+            <a:fld id="{D57F1E4F-1CFF-5643-939E-217C01CDF565}" type="slidenum">
+              <a:rPr lang="en-US" dirty="0"/>
+              <a:pPr/>
+              <a:t>‹#›</a:t>
+            </a:fld>
+            <a:endParaRPr lang="en-US" dirty="0"/>
+          </a:p>
+        </p:txBody>
+      </p:sp>
+    </p:spTree>
+    <p:extLst>
+      <p:ext uri="{BB962C8B-B14F-4D97-AF65-F5344CB8AC3E}">
+        <p14:creationId xmlns:p14="http://schemas.microsoft.com/office/powerpoint/2010/main" val="460087372"/>
       </p:ext>
     </p:extLst>
   </p:cSld>
@@ -4402,7 +4751,7 @@
           <a:p>
             <a:fld id="{047FADAB-D9AF-4329-9DA2-0DFFD2DB93CA}" type="datetimeFigureOut">
               <a:rPr lang="en-US" smtClean="0"/>
-              <a:t>3/23/2019</a:t>
+              <a:t>3/30/2019</a:t>
             </a:fld>
             <a:endParaRPr lang="en-US"/>
           </a:p>
@@ -4639,7 +4988,7 @@
           <a:p>
             <a:fld id="{047FADAB-D9AF-4329-9DA2-0DFFD2DB93CA}" type="datetimeFigureOut">
               <a:rPr lang="en-US" smtClean="0"/>
-              <a:t>3/23/2019</a:t>
+              <a:t>3/30/2019</a:t>
             </a:fld>
             <a:endParaRPr lang="en-US"/>
           </a:p>
@@ -5024,7 +5373,7 @@
           <a:p>
             <a:fld id="{047FADAB-D9AF-4329-9DA2-0DFFD2DB93CA}" type="datetimeFigureOut">
               <a:rPr lang="en-US" smtClean="0"/>
-              <a:t>3/23/2019</a:t>
+              <a:t>3/30/2019</a:t>
             </a:fld>
             <a:endParaRPr lang="en-US"/>
           </a:p>
@@ -5142,7 +5491,7 @@
           <a:p>
             <a:fld id="{047FADAB-D9AF-4329-9DA2-0DFFD2DB93CA}" type="datetimeFigureOut">
               <a:rPr lang="en-US" smtClean="0"/>
-              <a:t>3/23/2019</a:t>
+              <a:t>3/30/2019</a:t>
             </a:fld>
             <a:endParaRPr lang="en-US"/>
           </a:p>
@@ -5237,7 +5586,7 @@
           <a:p>
             <a:fld id="{047FADAB-D9AF-4329-9DA2-0DFFD2DB93CA}" type="datetimeFigureOut">
               <a:rPr lang="en-US" smtClean="0"/>
-              <a:t>3/23/2019</a:t>
+              <a:t>3/30/2019</a:t>
             </a:fld>
             <a:endParaRPr lang="en-US"/>
           </a:p>
@@ -5490,7 +5839,7 @@
           <a:p>
             <a:fld id="{047FADAB-D9AF-4329-9DA2-0DFFD2DB93CA}" type="datetimeFigureOut">
               <a:rPr lang="en-US" smtClean="0"/>
-              <a:t>3/23/2019</a:t>
+              <a:t>3/30/2019</a:t>
             </a:fld>
             <a:endParaRPr lang="en-US"/>
           </a:p>
@@ -5759,7 +6108,7 @@
           <a:p>
             <a:fld id="{047FADAB-D9AF-4329-9DA2-0DFFD2DB93CA}" type="datetimeFigureOut">
               <a:rPr lang="en-US" smtClean="0"/>
-              <a:t>3/23/2019</a:t>
+              <a:t>3/30/2019</a:t>
             </a:fld>
             <a:endParaRPr lang="en-US"/>
           </a:p>
@@ -5851,7 +6200,7 @@
           <p:nvPr/>
         </p:nvPicPr>
         <p:blipFill>
-          <a:blip r:embed="rId21">
+          <a:blip r:embed="rId22">
             <a:extLst>
               <a:ext uri="{28A0092B-C50C-407E-A947-70E740481C1C}">
                 <a14:useLocalDpi xmlns:a14="http://schemas.microsoft.com/office/drawing/2010/main" val="0"/>
@@ -6162,7 +6511,7 @@
           <a:p>
             <a:fld id="{047FADAB-D9AF-4329-9DA2-0DFFD2DB93CA}" type="datetimeFigureOut">
               <a:rPr lang="en-US" smtClean="0"/>
-              <a:t>3/23/2019</a:t>
+              <a:t>3/30/2019</a:t>
             </a:fld>
             <a:endParaRPr lang="en-US"/>
           </a:p>
@@ -6274,6 +6623,7 @@
     <p:sldLayoutId id="2147483761" r:id="rId17"/>
     <p:sldLayoutId id="2147483762" r:id="rId18"/>
     <p:sldLayoutId id="2147483763" r:id="rId19"/>
+    <p:sldLayoutId id="2147483764" r:id="rId20"/>
   </p:sldLayoutIdLst>
   <p:txStyles>
     <p:titleStyle>
@@ -11517,6 +11867,1816 @@
       </p:grpSpPr>
       <p:sp>
         <p:nvSpPr>
+          <p:cNvPr id="2" name="Judul 1">
+            <a:extLst>
+              <a:ext uri="{FF2B5EF4-FFF2-40B4-BE49-F238E27FC236}">
+                <a16:creationId xmlns:a16="http://schemas.microsoft.com/office/drawing/2014/main" id="{CF32B412-AD7C-438E-96DE-0E515D1A29BB}"/>
+              </a:ext>
+            </a:extLst>
+          </p:cNvPr>
+          <p:cNvSpPr>
+            <a:spLocks noGrp="1"/>
+          </p:cNvSpPr>
+          <p:nvPr>
+            <p:ph type="title"/>
+          </p:nvPr>
+        </p:nvSpPr>
+        <p:spPr>
+          <a:xfrm>
+            <a:off x="2589212" y="930876"/>
+            <a:ext cx="8915399" cy="626076"/>
+          </a:xfrm>
+        </p:spPr>
+        <p:txBody>
+          <a:bodyPr>
+            <a:normAutofit fontScale="90000"/>
+          </a:bodyPr>
+          <a:lstStyle/>
+          <a:p>
+            <a:pPr algn="ctr"/>
+            <a:r>
+              <a:rPr lang="id-ID" b="1" dirty="0" err="1"/>
+              <a:t>Jupyter</a:t>
+            </a:r>
+            <a:endParaRPr lang="en-US" b="1" dirty="0"/>
+          </a:p>
+        </p:txBody>
+      </p:sp>
+      <p:sp>
+        <p:nvSpPr>
+          <p:cNvPr id="3" name="Tampungan Teks 2">
+            <a:extLst>
+              <a:ext uri="{FF2B5EF4-FFF2-40B4-BE49-F238E27FC236}">
+                <a16:creationId xmlns:a16="http://schemas.microsoft.com/office/drawing/2014/main" id="{D6D857E0-E04F-432A-916B-62FC94E3EC87}"/>
+              </a:ext>
+            </a:extLst>
+          </p:cNvPr>
+          <p:cNvSpPr>
+            <a:spLocks noGrp="1"/>
+          </p:cNvSpPr>
+          <p:nvPr>
+            <p:ph type="body" idx="1"/>
+          </p:nvPr>
+        </p:nvSpPr>
+        <p:spPr>
+          <a:xfrm>
+            <a:off x="2589212" y="2475818"/>
+            <a:ext cx="8915399" cy="1555864"/>
+          </a:xfrm>
+        </p:spPr>
+        <p:txBody>
+          <a:bodyPr/>
+          <a:lstStyle/>
+          <a:p>
+            <a:pPr algn="just"/>
+            <a:r>
+              <a:rPr lang="en-US" dirty="0" err="1">
+                <a:solidFill>
+                  <a:schemeClr val="tx1"/>
+                </a:solidFill>
+              </a:rPr>
+              <a:t>Jupyter</a:t>
+            </a:r>
+            <a:r>
+              <a:rPr lang="en-US" dirty="0">
+                <a:solidFill>
+                  <a:schemeClr val="tx1"/>
+                </a:solidFill>
+              </a:rPr>
+              <a:t> </a:t>
+            </a:r>
+            <a:r>
+              <a:rPr lang="en-US" dirty="0" err="1">
+                <a:solidFill>
+                  <a:schemeClr val="tx1"/>
+                </a:solidFill>
+              </a:rPr>
+              <a:t>adalah</a:t>
+            </a:r>
+            <a:r>
+              <a:rPr lang="en-US" dirty="0">
+                <a:solidFill>
+                  <a:schemeClr val="tx1"/>
+                </a:solidFill>
+              </a:rPr>
+              <a:t> tools yang </a:t>
+            </a:r>
+            <a:r>
+              <a:rPr lang="en-US" dirty="0" err="1">
+                <a:solidFill>
+                  <a:schemeClr val="tx1"/>
+                </a:solidFill>
+              </a:rPr>
+              <a:t>digunakan</a:t>
+            </a:r>
+            <a:r>
+              <a:rPr lang="en-US" dirty="0">
+                <a:solidFill>
+                  <a:schemeClr val="tx1"/>
+                </a:solidFill>
+              </a:rPr>
+              <a:t> </a:t>
+            </a:r>
+            <a:r>
+              <a:rPr lang="en-US" dirty="0" err="1">
+                <a:solidFill>
+                  <a:schemeClr val="tx1"/>
+                </a:solidFill>
+              </a:rPr>
+              <a:t>untuk</a:t>
+            </a:r>
+            <a:r>
+              <a:rPr lang="en-US" dirty="0">
+                <a:solidFill>
+                  <a:schemeClr val="tx1"/>
+                </a:solidFill>
+              </a:rPr>
+              <a:t> </a:t>
+            </a:r>
+            <a:r>
+              <a:rPr lang="en-US" dirty="0" err="1">
+                <a:solidFill>
+                  <a:schemeClr val="tx1"/>
+                </a:solidFill>
+              </a:rPr>
+              <a:t>mendokumentasikan</a:t>
+            </a:r>
+            <a:r>
+              <a:rPr lang="en-US" dirty="0">
+                <a:solidFill>
+                  <a:schemeClr val="tx1"/>
+                </a:solidFill>
+              </a:rPr>
+              <a:t> </a:t>
+            </a:r>
+            <a:r>
+              <a:rPr lang="en-US" dirty="0" err="1">
+                <a:solidFill>
+                  <a:schemeClr val="tx1"/>
+                </a:solidFill>
+              </a:rPr>
+              <a:t>sebuah</a:t>
+            </a:r>
+            <a:r>
+              <a:rPr lang="en-US" dirty="0">
+                <a:solidFill>
+                  <a:schemeClr val="tx1"/>
+                </a:solidFill>
+              </a:rPr>
+              <a:t> </a:t>
+            </a:r>
+            <a:r>
+              <a:rPr lang="en-US" dirty="0" err="1">
+                <a:solidFill>
+                  <a:schemeClr val="tx1"/>
+                </a:solidFill>
+              </a:rPr>
+              <a:t>pekerjaan</a:t>
+            </a:r>
+            <a:r>
+              <a:rPr lang="en-US" dirty="0">
+                <a:solidFill>
+                  <a:schemeClr val="tx1"/>
+                </a:solidFill>
+              </a:rPr>
+              <a:t> (</a:t>
+            </a:r>
+            <a:r>
+              <a:rPr lang="en-US" b="1" dirty="0">
+                <a:solidFill>
+                  <a:schemeClr val="tx1"/>
+                </a:solidFill>
+              </a:rPr>
+              <a:t>code dan </a:t>
+            </a:r>
+            <a:r>
+              <a:rPr lang="en-US" b="1" dirty="0" err="1">
+                <a:solidFill>
+                  <a:schemeClr val="tx1"/>
+                </a:solidFill>
+              </a:rPr>
+              <a:t>penjelasan</a:t>
+            </a:r>
+            <a:r>
+              <a:rPr lang="en-US" b="1" dirty="0">
+                <a:solidFill>
+                  <a:schemeClr val="tx1"/>
+                </a:solidFill>
+              </a:rPr>
+              <a:t> </a:t>
+            </a:r>
+            <a:r>
+              <a:rPr lang="en-US" b="1" dirty="0" err="1">
+                <a:solidFill>
+                  <a:schemeClr val="tx1"/>
+                </a:solidFill>
+              </a:rPr>
+              <a:t>bisa</a:t>
+            </a:r>
+            <a:r>
+              <a:rPr lang="en-US" b="1" dirty="0">
+                <a:solidFill>
+                  <a:schemeClr val="tx1"/>
+                </a:solidFill>
+              </a:rPr>
+              <a:t> </a:t>
+            </a:r>
+            <a:r>
+              <a:rPr lang="en-US" b="1" dirty="0" err="1">
+                <a:solidFill>
+                  <a:schemeClr val="tx1"/>
+                </a:solidFill>
+              </a:rPr>
+              <a:t>dalam</a:t>
+            </a:r>
+            <a:r>
+              <a:rPr lang="en-US" b="1" dirty="0">
+                <a:solidFill>
+                  <a:schemeClr val="tx1"/>
+                </a:solidFill>
+              </a:rPr>
+              <a:t> </a:t>
+            </a:r>
+            <a:r>
+              <a:rPr lang="en-US" b="1" dirty="0" err="1">
+                <a:solidFill>
+                  <a:schemeClr val="tx1"/>
+                </a:solidFill>
+              </a:rPr>
+              <a:t>satu</a:t>
+            </a:r>
+            <a:r>
+              <a:rPr lang="en-US" b="1" dirty="0">
+                <a:solidFill>
+                  <a:schemeClr val="tx1"/>
+                </a:solidFill>
+              </a:rPr>
+              <a:t> </a:t>
+            </a:r>
+            <a:r>
+              <a:rPr lang="en-US" b="1" dirty="0" err="1">
+                <a:solidFill>
+                  <a:schemeClr val="tx1"/>
+                </a:solidFill>
+              </a:rPr>
+              <a:t>halaman</a:t>
+            </a:r>
+            <a:r>
+              <a:rPr lang="en-US" dirty="0">
+                <a:solidFill>
+                  <a:schemeClr val="tx1"/>
+                </a:solidFill>
+              </a:rPr>
+              <a:t>) yang </a:t>
+            </a:r>
+            <a:r>
+              <a:rPr lang="en-US" dirty="0" err="1">
+                <a:solidFill>
+                  <a:schemeClr val="tx1"/>
+                </a:solidFill>
+              </a:rPr>
+              <a:t>kita</a:t>
+            </a:r>
+            <a:r>
+              <a:rPr lang="en-US" dirty="0">
+                <a:solidFill>
+                  <a:schemeClr val="tx1"/>
+                </a:solidFill>
+              </a:rPr>
+              <a:t> </a:t>
+            </a:r>
+            <a:r>
+              <a:rPr lang="en-US" dirty="0" err="1">
+                <a:solidFill>
+                  <a:schemeClr val="tx1"/>
+                </a:solidFill>
+              </a:rPr>
+              <a:t>lakukan</a:t>
+            </a:r>
+            <a:r>
+              <a:rPr lang="en-US" dirty="0">
+                <a:solidFill>
+                  <a:schemeClr val="tx1"/>
+                </a:solidFill>
+              </a:rPr>
+              <a:t> </a:t>
+            </a:r>
+            <a:r>
+              <a:rPr lang="en-US" dirty="0" err="1">
+                <a:solidFill>
+                  <a:schemeClr val="tx1"/>
+                </a:solidFill>
+              </a:rPr>
+              <a:t>dapat</a:t>
+            </a:r>
+            <a:r>
+              <a:rPr lang="en-US" dirty="0">
+                <a:solidFill>
+                  <a:schemeClr val="tx1"/>
+                </a:solidFill>
+              </a:rPr>
+              <a:t> </a:t>
+            </a:r>
+            <a:r>
+              <a:rPr lang="en-US" dirty="0" err="1">
+                <a:solidFill>
+                  <a:schemeClr val="tx1"/>
+                </a:solidFill>
+              </a:rPr>
+              <a:t>disimpan</a:t>
+            </a:r>
+            <a:r>
+              <a:rPr lang="en-US" dirty="0">
+                <a:solidFill>
+                  <a:schemeClr val="tx1"/>
+                </a:solidFill>
+              </a:rPr>
+              <a:t> </a:t>
+            </a:r>
+            <a:r>
+              <a:rPr lang="en-US" dirty="0" err="1">
+                <a:solidFill>
+                  <a:schemeClr val="tx1"/>
+                </a:solidFill>
+              </a:rPr>
+              <a:t>dalam</a:t>
+            </a:r>
+            <a:r>
+              <a:rPr lang="en-US" dirty="0">
+                <a:solidFill>
+                  <a:schemeClr val="tx1"/>
+                </a:solidFill>
+              </a:rPr>
+              <a:t> </a:t>
+            </a:r>
+            <a:r>
+              <a:rPr lang="en-US" dirty="0" err="1">
+                <a:solidFill>
+                  <a:schemeClr val="tx1"/>
+                </a:solidFill>
+              </a:rPr>
+              <a:t>bentuk</a:t>
+            </a:r>
+            <a:r>
+              <a:rPr lang="en-US" dirty="0">
+                <a:solidFill>
+                  <a:schemeClr val="tx1"/>
+                </a:solidFill>
+              </a:rPr>
+              <a:t> </a:t>
+            </a:r>
+            <a:r>
+              <a:rPr lang="en-US" dirty="0" err="1">
+                <a:solidFill>
+                  <a:schemeClr val="tx1"/>
+                </a:solidFill>
+              </a:rPr>
+              <a:t>presentasi</a:t>
+            </a:r>
+            <a:r>
+              <a:rPr lang="en-US" dirty="0">
+                <a:solidFill>
+                  <a:schemeClr val="tx1"/>
+                </a:solidFill>
+              </a:rPr>
+              <a:t> dan </a:t>
+            </a:r>
+            <a:r>
+              <a:rPr lang="en-US" dirty="0" err="1">
+                <a:solidFill>
+                  <a:schemeClr val="tx1"/>
+                </a:solidFill>
+              </a:rPr>
+              <a:t>tampilan</a:t>
+            </a:r>
+            <a:r>
+              <a:rPr lang="en-US" dirty="0">
+                <a:solidFill>
+                  <a:schemeClr val="tx1"/>
+                </a:solidFill>
+              </a:rPr>
+              <a:t> yang </a:t>
+            </a:r>
+            <a:r>
+              <a:rPr lang="en-US" dirty="0" err="1">
+                <a:solidFill>
+                  <a:schemeClr val="tx1"/>
+                </a:solidFill>
+              </a:rPr>
+              <a:t>menarik</a:t>
+            </a:r>
+            <a:r>
+              <a:rPr lang="en-US" dirty="0">
+                <a:solidFill>
+                  <a:schemeClr val="tx1"/>
+                </a:solidFill>
+              </a:rPr>
+              <a:t>.</a:t>
+            </a:r>
+          </a:p>
+        </p:txBody>
+      </p:sp>
+    </p:spTree>
+    <p:extLst>
+      <p:ext uri="{BB962C8B-B14F-4D97-AF65-F5344CB8AC3E}">
+        <p14:creationId xmlns:p14="http://schemas.microsoft.com/office/powerpoint/2010/main" val="669316959"/>
+      </p:ext>
+    </p:extLst>
+  </p:cSld>
+  <p:clrMapOvr>
+    <a:masterClrMapping/>
+  </p:clrMapOvr>
+</p:sld>
+</file>
+
+<file path=ppt/slides/slide27.xml><?xml version="1.0" encoding="utf-8"?>
+<p:sld xmlns:a="http://schemas.openxmlformats.org/drawingml/2006/main" xmlns:r="http://schemas.openxmlformats.org/officeDocument/2006/relationships" xmlns:p="http://schemas.openxmlformats.org/presentationml/2006/main">
+  <p:cSld>
+    <p:spTree>
+      <p:nvGrpSpPr>
+        <p:cNvPr id="1" name=""/>
+        <p:cNvGrpSpPr/>
+        <p:nvPr/>
+      </p:nvGrpSpPr>
+      <p:grpSpPr>
+        <a:xfrm>
+          <a:off x="0" y="0"/>
+          <a:ext cx="0" cy="0"/>
+          <a:chOff x="0" y="0"/>
+          <a:chExt cx="0" cy="0"/>
+        </a:xfrm>
+      </p:grpSpPr>
+      <p:sp>
+        <p:nvSpPr>
+          <p:cNvPr id="2" name="Judul 1">
+            <a:extLst>
+              <a:ext uri="{FF2B5EF4-FFF2-40B4-BE49-F238E27FC236}">
+                <a16:creationId xmlns:a16="http://schemas.microsoft.com/office/drawing/2014/main" id="{0DCE6C2C-C72B-498F-B26F-86C967FA8315}"/>
+              </a:ext>
+            </a:extLst>
+          </p:cNvPr>
+          <p:cNvSpPr>
+            <a:spLocks noGrp="1"/>
+          </p:cNvSpPr>
+          <p:nvPr>
+            <p:ph type="title"/>
+          </p:nvPr>
+        </p:nvSpPr>
+        <p:spPr>
+          <a:xfrm>
+            <a:off x="2589208" y="696097"/>
+            <a:ext cx="8915399" cy="613719"/>
+          </a:xfrm>
+        </p:spPr>
+        <p:txBody>
+          <a:bodyPr>
+            <a:noAutofit/>
+          </a:bodyPr>
+          <a:lstStyle/>
+          <a:p>
+            <a:r>
+              <a:rPr lang="id-ID" sz="4300" b="1" dirty="0"/>
+              <a:t>Instalasi </a:t>
+            </a:r>
+            <a:r>
+              <a:rPr lang="id-ID" sz="4300" b="1" dirty="0" err="1"/>
+              <a:t>Jupyter</a:t>
+            </a:r>
+            <a:r>
+              <a:rPr lang="id-ID" sz="4300" b="1" dirty="0"/>
+              <a:t> Pada </a:t>
+            </a:r>
+            <a:r>
+              <a:rPr lang="id-ID" sz="4300" b="1" dirty="0" err="1"/>
+              <a:t>Pyhton</a:t>
+            </a:r>
+            <a:endParaRPr lang="en-US" sz="4300" b="1" dirty="0"/>
+          </a:p>
+        </p:txBody>
+      </p:sp>
+      <p:pic>
+        <p:nvPicPr>
+          <p:cNvPr id="4" name="Gambar 3">
+            <a:extLst>
+              <a:ext uri="{FF2B5EF4-FFF2-40B4-BE49-F238E27FC236}">
+                <a16:creationId xmlns:a16="http://schemas.microsoft.com/office/drawing/2014/main" id="{4C6AF203-2A16-4C03-B847-A239D010E581}"/>
+              </a:ext>
+            </a:extLst>
+          </p:cNvPr>
+          <p:cNvPicPr/>
+          <p:nvPr/>
+        </p:nvPicPr>
+        <p:blipFill>
+          <a:blip r:embed="rId2"/>
+          <a:stretch>
+            <a:fillRect/>
+          </a:stretch>
+        </p:blipFill>
+        <p:spPr>
+          <a:xfrm>
+            <a:off x="3190570" y="2582829"/>
+            <a:ext cx="7712677" cy="2088024"/>
+          </a:xfrm>
+          <a:prstGeom prst="rect">
+            <a:avLst/>
+          </a:prstGeom>
+        </p:spPr>
+      </p:pic>
+    </p:spTree>
+    <p:extLst>
+      <p:ext uri="{BB962C8B-B14F-4D97-AF65-F5344CB8AC3E}">
+        <p14:creationId xmlns:p14="http://schemas.microsoft.com/office/powerpoint/2010/main" val="3662198218"/>
+      </p:ext>
+    </p:extLst>
+  </p:cSld>
+  <p:clrMapOvr>
+    <a:masterClrMapping/>
+  </p:clrMapOvr>
+</p:sld>
+</file>
+
+<file path=ppt/slides/slide28.xml><?xml version="1.0" encoding="utf-8"?>
+<p:sld xmlns:a="http://schemas.openxmlformats.org/drawingml/2006/main" xmlns:r="http://schemas.openxmlformats.org/officeDocument/2006/relationships" xmlns:p="http://schemas.openxmlformats.org/presentationml/2006/main">
+  <p:cSld>
+    <p:spTree>
+      <p:nvGrpSpPr>
+        <p:cNvPr id="1" name=""/>
+        <p:cNvGrpSpPr/>
+        <p:nvPr/>
+      </p:nvGrpSpPr>
+      <p:grpSpPr>
+        <a:xfrm>
+          <a:off x="0" y="0"/>
+          <a:ext cx="0" cy="0"/>
+          <a:chOff x="0" y="0"/>
+          <a:chExt cx="0" cy="0"/>
+        </a:xfrm>
+      </p:grpSpPr>
+      <p:sp>
+        <p:nvSpPr>
+          <p:cNvPr id="3" name="Tampungan Teks 2">
+            <a:extLst>
+              <a:ext uri="{FF2B5EF4-FFF2-40B4-BE49-F238E27FC236}">
+                <a16:creationId xmlns:a16="http://schemas.microsoft.com/office/drawing/2014/main" id="{C9460BB7-3C03-45CE-9CC4-D3A1FB12B8C3}"/>
+              </a:ext>
+            </a:extLst>
+          </p:cNvPr>
+          <p:cNvSpPr>
+            <a:spLocks noGrp="1"/>
+          </p:cNvSpPr>
+          <p:nvPr>
+            <p:ph type="body" idx="1"/>
+          </p:nvPr>
+        </p:nvSpPr>
+        <p:spPr>
+          <a:xfrm>
+            <a:off x="2700421" y="325743"/>
+            <a:ext cx="8915399" cy="1555864"/>
+          </a:xfrm>
+        </p:spPr>
+        <p:txBody>
+          <a:bodyPr/>
+          <a:lstStyle/>
+          <a:p>
+            <a:endParaRPr lang="en-US" dirty="0"/>
+          </a:p>
+        </p:txBody>
+      </p:sp>
+      <p:pic>
+        <p:nvPicPr>
+          <p:cNvPr id="4" name="Gambar 3">
+            <a:extLst>
+              <a:ext uri="{FF2B5EF4-FFF2-40B4-BE49-F238E27FC236}">
+                <a16:creationId xmlns:a16="http://schemas.microsoft.com/office/drawing/2014/main" id="{FC75A854-27F1-4F47-BBF2-0BEDE2B7D0A0}"/>
+              </a:ext>
+            </a:extLst>
+          </p:cNvPr>
+          <p:cNvPicPr/>
+          <p:nvPr/>
+        </p:nvPicPr>
+        <p:blipFill>
+          <a:blip r:embed="rId2"/>
+          <a:stretch>
+            <a:fillRect/>
+          </a:stretch>
+        </p:blipFill>
+        <p:spPr>
+          <a:xfrm>
+            <a:off x="3301782" y="2167243"/>
+            <a:ext cx="7712676" cy="343599"/>
+          </a:xfrm>
+          <a:prstGeom prst="rect">
+            <a:avLst/>
+          </a:prstGeom>
+        </p:spPr>
+      </p:pic>
+      <p:pic>
+        <p:nvPicPr>
+          <p:cNvPr id="5" name="Gambar 4">
+            <a:extLst>
+              <a:ext uri="{FF2B5EF4-FFF2-40B4-BE49-F238E27FC236}">
+                <a16:creationId xmlns:a16="http://schemas.microsoft.com/office/drawing/2014/main" id="{3F5D4BA9-62EC-4016-8F16-E0F46B3DCA72}"/>
+              </a:ext>
+            </a:extLst>
+          </p:cNvPr>
+          <p:cNvPicPr/>
+          <p:nvPr/>
+        </p:nvPicPr>
+        <p:blipFill>
+          <a:blip r:embed="rId3"/>
+          <a:stretch>
+            <a:fillRect/>
+          </a:stretch>
+        </p:blipFill>
+        <p:spPr>
+          <a:xfrm>
+            <a:off x="3301782" y="2510842"/>
+            <a:ext cx="7712676" cy="4347158"/>
+          </a:xfrm>
+          <a:prstGeom prst="rect">
+            <a:avLst/>
+          </a:prstGeom>
+        </p:spPr>
+      </p:pic>
+    </p:spTree>
+    <p:extLst>
+      <p:ext uri="{BB962C8B-B14F-4D97-AF65-F5344CB8AC3E}">
+        <p14:creationId xmlns:p14="http://schemas.microsoft.com/office/powerpoint/2010/main" val="720088251"/>
+      </p:ext>
+    </p:extLst>
+  </p:cSld>
+  <p:clrMapOvr>
+    <a:masterClrMapping/>
+  </p:clrMapOvr>
+</p:sld>
+</file>
+
+<file path=ppt/slides/slide29.xml><?xml version="1.0" encoding="utf-8"?>
+<p:sld xmlns:a="http://schemas.openxmlformats.org/drawingml/2006/main" xmlns:r="http://schemas.openxmlformats.org/officeDocument/2006/relationships" xmlns:p="http://schemas.openxmlformats.org/presentationml/2006/main">
+  <p:cSld>
+    <p:spTree>
+      <p:nvGrpSpPr>
+        <p:cNvPr id="1" name=""/>
+        <p:cNvGrpSpPr/>
+        <p:nvPr/>
+      </p:nvGrpSpPr>
+      <p:grpSpPr>
+        <a:xfrm>
+          <a:off x="0" y="0"/>
+          <a:ext cx="0" cy="0"/>
+          <a:chOff x="0" y="0"/>
+          <a:chExt cx="0" cy="0"/>
+        </a:xfrm>
+      </p:grpSpPr>
+      <p:sp>
+        <p:nvSpPr>
+          <p:cNvPr id="3" name="Tampungan Teks 2">
+            <a:extLst>
+              <a:ext uri="{FF2B5EF4-FFF2-40B4-BE49-F238E27FC236}">
+                <a16:creationId xmlns:a16="http://schemas.microsoft.com/office/drawing/2014/main" id="{CB616534-EE60-4F4F-8DBE-A7707883D94D}"/>
+              </a:ext>
+            </a:extLst>
+          </p:cNvPr>
+          <p:cNvSpPr>
+            <a:spLocks noGrp="1"/>
+          </p:cNvSpPr>
+          <p:nvPr>
+            <p:ph type="body" idx="1"/>
+          </p:nvPr>
+        </p:nvSpPr>
+        <p:spPr>
+          <a:xfrm>
+            <a:off x="2695832" y="214533"/>
+            <a:ext cx="8915399" cy="1555864"/>
+          </a:xfrm>
+        </p:spPr>
+        <p:txBody>
+          <a:bodyPr/>
+          <a:lstStyle/>
+          <a:p>
+            <a:endParaRPr lang="en-US" dirty="0"/>
+          </a:p>
+        </p:txBody>
+      </p:sp>
+      <p:pic>
+        <p:nvPicPr>
+          <p:cNvPr id="4" name="Gambar 3">
+            <a:extLst>
+              <a:ext uri="{FF2B5EF4-FFF2-40B4-BE49-F238E27FC236}">
+                <a16:creationId xmlns:a16="http://schemas.microsoft.com/office/drawing/2014/main" id="{1AF51DD5-196C-44C4-B77F-54E3C26EFF5F}"/>
+              </a:ext>
+            </a:extLst>
+          </p:cNvPr>
+          <p:cNvPicPr/>
+          <p:nvPr/>
+        </p:nvPicPr>
+        <p:blipFill>
+          <a:blip r:embed="rId2"/>
+          <a:stretch>
+            <a:fillRect/>
+          </a:stretch>
+        </p:blipFill>
+        <p:spPr>
+          <a:xfrm>
+            <a:off x="2695831" y="2330158"/>
+            <a:ext cx="8915399" cy="1797000"/>
+          </a:xfrm>
+          <a:prstGeom prst="rect">
+            <a:avLst/>
+          </a:prstGeom>
+        </p:spPr>
+      </p:pic>
+    </p:spTree>
+    <p:extLst>
+      <p:ext uri="{BB962C8B-B14F-4D97-AF65-F5344CB8AC3E}">
+        <p14:creationId xmlns:p14="http://schemas.microsoft.com/office/powerpoint/2010/main" val="1374993462"/>
+      </p:ext>
+    </p:extLst>
+  </p:cSld>
+  <p:clrMapOvr>
+    <a:masterClrMapping/>
+  </p:clrMapOvr>
+</p:sld>
+</file>
+
+<file path=ppt/slides/slide3.xml><?xml version="1.0" encoding="utf-8"?>
+<p:sld xmlns:a="http://schemas.openxmlformats.org/drawingml/2006/main" xmlns:r="http://schemas.openxmlformats.org/officeDocument/2006/relationships" xmlns:p="http://schemas.openxmlformats.org/presentationml/2006/main">
+  <p:cSld>
+    <p:spTree>
+      <p:nvGrpSpPr>
+        <p:cNvPr id="1" name=""/>
+        <p:cNvGrpSpPr/>
+        <p:nvPr/>
+      </p:nvGrpSpPr>
+      <p:grpSpPr>
+        <a:xfrm>
+          <a:off x="0" y="0"/>
+          <a:ext cx="0" cy="0"/>
+          <a:chOff x="0" y="0"/>
+          <a:chExt cx="0" cy="0"/>
+        </a:xfrm>
+      </p:grpSpPr>
+      <p:sp>
+        <p:nvSpPr>
+          <p:cNvPr id="2" name="Title 1">
+            <a:extLst>
+              <a:ext uri="{FF2B5EF4-FFF2-40B4-BE49-F238E27FC236}">
+                <a16:creationId xmlns:a16="http://schemas.microsoft.com/office/drawing/2014/main" id="{E032B052-9AB9-479B-B9CC-8BDFDF47E40C}"/>
+              </a:ext>
+            </a:extLst>
+          </p:cNvPr>
+          <p:cNvSpPr>
+            <a:spLocks noGrp="1"/>
+          </p:cNvSpPr>
+          <p:nvPr>
+            <p:ph type="title"/>
+          </p:nvPr>
+        </p:nvSpPr>
+        <p:spPr/>
+        <p:txBody>
+          <a:bodyPr/>
+          <a:lstStyle/>
+          <a:p>
+            <a:pPr algn="ctr"/>
+            <a:r>
+              <a:rPr lang="en-US" dirty="0"/>
+              <a:t>package MANAGER (</a:t>
+            </a:r>
+            <a:r>
+              <a:rPr lang="en-US" dirty="0" err="1"/>
+              <a:t>instalasi</a:t>
+            </a:r>
+            <a:r>
+              <a:rPr lang="en-US" dirty="0"/>
+              <a:t>)</a:t>
+            </a:r>
+          </a:p>
+        </p:txBody>
+      </p:sp>
+      <p:sp>
+        <p:nvSpPr>
+          <p:cNvPr id="4" name="Content Placeholder 3">
+            <a:extLst>
+              <a:ext uri="{FF2B5EF4-FFF2-40B4-BE49-F238E27FC236}">
+                <a16:creationId xmlns:a16="http://schemas.microsoft.com/office/drawing/2014/main" id="{DE6F0A50-415D-4E41-B51A-EE7F37B749D4}"/>
+              </a:ext>
+            </a:extLst>
+          </p:cNvPr>
+          <p:cNvSpPr>
+            <a:spLocks noGrp="1"/>
+          </p:cNvSpPr>
+          <p:nvPr>
+            <p:ph sz="half" idx="1"/>
+          </p:nvPr>
+        </p:nvSpPr>
+        <p:spPr/>
+        <p:txBody>
+          <a:bodyPr/>
+          <a:lstStyle/>
+          <a:p>
+            <a:endParaRPr lang="en-US"/>
+          </a:p>
+        </p:txBody>
+      </p:sp>
+      <p:pic>
+        <p:nvPicPr>
+          <p:cNvPr id="6" name="Content Placeholder 5">
+            <a:extLst>
+              <a:ext uri="{FF2B5EF4-FFF2-40B4-BE49-F238E27FC236}">
+                <a16:creationId xmlns:a16="http://schemas.microsoft.com/office/drawing/2014/main" id="{0CFEC6E1-C846-4CE0-9B18-CAD7F70A983B}"/>
+              </a:ext>
+            </a:extLst>
+          </p:cNvPr>
+          <p:cNvPicPr>
+            <a:picLocks noGrp="1" noChangeAspect="1"/>
+          </p:cNvPicPr>
+          <p:nvPr>
+            <p:ph sz="half" idx="2"/>
+          </p:nvPr>
+        </p:nvPicPr>
+        <p:blipFill>
+          <a:blip r:embed="rId2"/>
+          <a:stretch>
+            <a:fillRect/>
+          </a:stretch>
+        </p:blipFill>
+        <p:spPr>
+          <a:xfrm>
+            <a:off x="3447288" y="2535918"/>
+            <a:ext cx="4591050" cy="2771775"/>
+          </a:xfrm>
+          <a:prstGeom prst="rect">
+            <a:avLst/>
+          </a:prstGeom>
+        </p:spPr>
+      </p:pic>
+    </p:spTree>
+    <p:extLst>
+      <p:ext uri="{BB962C8B-B14F-4D97-AF65-F5344CB8AC3E}">
+        <p14:creationId xmlns:p14="http://schemas.microsoft.com/office/powerpoint/2010/main" val="354257116"/>
+      </p:ext>
+    </p:extLst>
+  </p:cSld>
+  <p:clrMapOvr>
+    <a:masterClrMapping/>
+  </p:clrMapOvr>
+</p:sld>
+</file>
+
+<file path=ppt/slides/slide30.xml><?xml version="1.0" encoding="utf-8"?>
+<p:sld xmlns:a="http://schemas.openxmlformats.org/drawingml/2006/main" xmlns:r="http://schemas.openxmlformats.org/officeDocument/2006/relationships" xmlns:p="http://schemas.openxmlformats.org/presentationml/2006/main">
+  <p:cSld>
+    <p:spTree>
+      <p:nvGrpSpPr>
+        <p:cNvPr id="1" name=""/>
+        <p:cNvGrpSpPr/>
+        <p:nvPr/>
+      </p:nvGrpSpPr>
+      <p:grpSpPr>
+        <a:xfrm>
+          <a:off x="0" y="0"/>
+          <a:ext cx="0" cy="0"/>
+          <a:chOff x="0" y="0"/>
+          <a:chExt cx="0" cy="0"/>
+        </a:xfrm>
+      </p:grpSpPr>
+      <p:sp>
+        <p:nvSpPr>
+          <p:cNvPr id="3" name="Tampungan Teks 2">
+            <a:extLst>
+              <a:ext uri="{FF2B5EF4-FFF2-40B4-BE49-F238E27FC236}">
+                <a16:creationId xmlns:a16="http://schemas.microsoft.com/office/drawing/2014/main" id="{7C5E8486-B9AB-493B-A6A0-CEFCAB988425}"/>
+              </a:ext>
+            </a:extLst>
+          </p:cNvPr>
+          <p:cNvSpPr>
+            <a:spLocks noGrp="1"/>
+          </p:cNvSpPr>
+          <p:nvPr>
+            <p:ph type="body" idx="1"/>
+          </p:nvPr>
+        </p:nvSpPr>
+        <p:spPr>
+          <a:xfrm>
+            <a:off x="2589214" y="309765"/>
+            <a:ext cx="8915399" cy="1555864"/>
+          </a:xfrm>
+        </p:spPr>
+        <p:txBody>
+          <a:bodyPr/>
+          <a:lstStyle/>
+          <a:p>
+            <a:endParaRPr lang="en-US" dirty="0"/>
+          </a:p>
+        </p:txBody>
+      </p:sp>
+      <p:pic>
+        <p:nvPicPr>
+          <p:cNvPr id="4" name="Gambar 3">
+            <a:extLst>
+              <a:ext uri="{FF2B5EF4-FFF2-40B4-BE49-F238E27FC236}">
+                <a16:creationId xmlns:a16="http://schemas.microsoft.com/office/drawing/2014/main" id="{0392C333-B097-4965-B505-961412742C28}"/>
+              </a:ext>
+            </a:extLst>
+          </p:cNvPr>
+          <p:cNvPicPr/>
+          <p:nvPr/>
+        </p:nvPicPr>
+        <p:blipFill>
+          <a:blip r:embed="rId2"/>
+          <a:stretch>
+            <a:fillRect/>
+          </a:stretch>
+        </p:blipFill>
+        <p:spPr>
+          <a:xfrm>
+            <a:off x="2589214" y="2112765"/>
+            <a:ext cx="8915398" cy="4300392"/>
+          </a:xfrm>
+          <a:prstGeom prst="rect">
+            <a:avLst/>
+          </a:prstGeom>
+        </p:spPr>
+      </p:pic>
+    </p:spTree>
+    <p:extLst>
+      <p:ext uri="{BB962C8B-B14F-4D97-AF65-F5344CB8AC3E}">
+        <p14:creationId xmlns:p14="http://schemas.microsoft.com/office/powerpoint/2010/main" val="3082912626"/>
+      </p:ext>
+    </p:extLst>
+  </p:cSld>
+  <p:clrMapOvr>
+    <a:masterClrMapping/>
+  </p:clrMapOvr>
+</p:sld>
+</file>
+
+<file path=ppt/slides/slide31.xml><?xml version="1.0" encoding="utf-8"?>
+<p:sld xmlns:a="http://schemas.openxmlformats.org/drawingml/2006/main" xmlns:r="http://schemas.openxmlformats.org/officeDocument/2006/relationships" xmlns:p="http://schemas.openxmlformats.org/presentationml/2006/main">
+  <p:cSld>
+    <p:spTree>
+      <p:nvGrpSpPr>
+        <p:cNvPr id="1" name=""/>
+        <p:cNvGrpSpPr/>
+        <p:nvPr/>
+      </p:nvGrpSpPr>
+      <p:grpSpPr>
+        <a:xfrm>
+          <a:off x="0" y="0"/>
+          <a:ext cx="0" cy="0"/>
+          <a:chOff x="0" y="0"/>
+          <a:chExt cx="0" cy="0"/>
+        </a:xfrm>
+      </p:grpSpPr>
+      <p:sp>
+        <p:nvSpPr>
+          <p:cNvPr id="3" name="Tampungan Teks 2">
+            <a:extLst>
+              <a:ext uri="{FF2B5EF4-FFF2-40B4-BE49-F238E27FC236}">
+                <a16:creationId xmlns:a16="http://schemas.microsoft.com/office/drawing/2014/main" id="{B945CB34-1818-4F49-93E9-0CF27B8207CB}"/>
+              </a:ext>
+            </a:extLst>
+          </p:cNvPr>
+          <p:cNvSpPr>
+            <a:spLocks noGrp="1"/>
+          </p:cNvSpPr>
+          <p:nvPr>
+            <p:ph type="body" idx="1"/>
+          </p:nvPr>
+        </p:nvSpPr>
+        <p:spPr>
+          <a:xfrm>
+            <a:off x="2589212" y="449311"/>
+            <a:ext cx="8915399" cy="1555864"/>
+          </a:xfrm>
+        </p:spPr>
+        <p:txBody>
+          <a:bodyPr/>
+          <a:lstStyle/>
+          <a:p>
+            <a:endParaRPr lang="en-US" dirty="0"/>
+          </a:p>
+        </p:txBody>
+      </p:sp>
+      <p:pic>
+        <p:nvPicPr>
+          <p:cNvPr id="4" name="Gambar 3">
+            <a:extLst>
+              <a:ext uri="{FF2B5EF4-FFF2-40B4-BE49-F238E27FC236}">
+                <a16:creationId xmlns:a16="http://schemas.microsoft.com/office/drawing/2014/main" id="{0BCA26A1-2849-476D-AAE5-7885C55861B1}"/>
+              </a:ext>
+            </a:extLst>
+          </p:cNvPr>
+          <p:cNvPicPr/>
+          <p:nvPr/>
+        </p:nvPicPr>
+        <p:blipFill>
+          <a:blip r:embed="rId2"/>
+          <a:stretch>
+            <a:fillRect/>
+          </a:stretch>
+        </p:blipFill>
+        <p:spPr>
+          <a:xfrm>
+            <a:off x="2589213" y="2533220"/>
+            <a:ext cx="8915398" cy="2792542"/>
+          </a:xfrm>
+          <a:prstGeom prst="rect">
+            <a:avLst/>
+          </a:prstGeom>
+        </p:spPr>
+      </p:pic>
+    </p:spTree>
+    <p:extLst>
+      <p:ext uri="{BB962C8B-B14F-4D97-AF65-F5344CB8AC3E}">
+        <p14:creationId xmlns:p14="http://schemas.microsoft.com/office/powerpoint/2010/main" val="3043286507"/>
+      </p:ext>
+    </p:extLst>
+  </p:cSld>
+  <p:clrMapOvr>
+    <a:masterClrMapping/>
+  </p:clrMapOvr>
+</p:sld>
+</file>
+
+<file path=ppt/slides/slide32.xml><?xml version="1.0" encoding="utf-8"?>
+<p:sld xmlns:a="http://schemas.openxmlformats.org/drawingml/2006/main" xmlns:r="http://schemas.openxmlformats.org/officeDocument/2006/relationships" xmlns:p="http://schemas.openxmlformats.org/presentationml/2006/main">
+  <p:cSld>
+    <p:spTree>
+      <p:nvGrpSpPr>
+        <p:cNvPr id="1" name=""/>
+        <p:cNvGrpSpPr/>
+        <p:nvPr/>
+      </p:nvGrpSpPr>
+      <p:grpSpPr>
+        <a:xfrm>
+          <a:off x="0" y="0"/>
+          <a:ext cx="0" cy="0"/>
+          <a:chOff x="0" y="0"/>
+          <a:chExt cx="0" cy="0"/>
+        </a:xfrm>
+      </p:grpSpPr>
+      <p:sp>
+        <p:nvSpPr>
+          <p:cNvPr id="2" name="Judul 1">
+            <a:extLst>
+              <a:ext uri="{FF2B5EF4-FFF2-40B4-BE49-F238E27FC236}">
+                <a16:creationId xmlns:a16="http://schemas.microsoft.com/office/drawing/2014/main" id="{EFC84874-0AEA-4718-986F-30387F5C540D}"/>
+              </a:ext>
+            </a:extLst>
+          </p:cNvPr>
+          <p:cNvSpPr>
+            <a:spLocks noGrp="1"/>
+          </p:cNvSpPr>
+          <p:nvPr>
+            <p:ph type="title"/>
+          </p:nvPr>
+        </p:nvSpPr>
+        <p:spPr>
+          <a:xfrm>
+            <a:off x="2589212" y="609600"/>
+            <a:ext cx="8915399" cy="1194486"/>
+          </a:xfrm>
+        </p:spPr>
+        <p:txBody>
+          <a:bodyPr/>
+          <a:lstStyle/>
+          <a:p>
+            <a:pPr algn="ctr"/>
+            <a:r>
+              <a:rPr lang="id-ID" b="1" dirty="0" err="1"/>
+              <a:t>Seaborn</a:t>
+            </a:r>
+            <a:endParaRPr lang="en-US" b="1" dirty="0"/>
+          </a:p>
+        </p:txBody>
+      </p:sp>
+      <p:sp>
+        <p:nvSpPr>
+          <p:cNvPr id="3" name="Tampungan Teks 2">
+            <a:extLst>
+              <a:ext uri="{FF2B5EF4-FFF2-40B4-BE49-F238E27FC236}">
+                <a16:creationId xmlns:a16="http://schemas.microsoft.com/office/drawing/2014/main" id="{BCB2119B-2CA6-4C12-966E-1BEB494A145B}"/>
+              </a:ext>
+            </a:extLst>
+          </p:cNvPr>
+          <p:cNvSpPr>
+            <a:spLocks noGrp="1"/>
+          </p:cNvSpPr>
+          <p:nvPr>
+            <p:ph type="body" idx="1"/>
+          </p:nvPr>
+        </p:nvSpPr>
+        <p:spPr>
+          <a:xfrm>
+            <a:off x="2589212" y="2006262"/>
+            <a:ext cx="8915399" cy="1555864"/>
+          </a:xfrm>
+        </p:spPr>
+        <p:txBody>
+          <a:bodyPr/>
+          <a:lstStyle/>
+          <a:p>
+            <a:pPr algn="just"/>
+            <a:r>
+              <a:rPr lang="en-US" dirty="0">
+                <a:solidFill>
+                  <a:schemeClr val="tx1"/>
+                </a:solidFill>
+              </a:rPr>
+              <a:t>Seaborn </a:t>
+            </a:r>
+            <a:r>
+              <a:rPr lang="en-US" dirty="0" err="1">
+                <a:solidFill>
+                  <a:schemeClr val="tx1"/>
+                </a:solidFill>
+              </a:rPr>
+              <a:t>adalah</a:t>
+            </a:r>
+            <a:r>
+              <a:rPr lang="en-US" dirty="0">
+                <a:solidFill>
+                  <a:schemeClr val="tx1"/>
+                </a:solidFill>
+              </a:rPr>
+              <a:t> library </a:t>
+            </a:r>
+            <a:r>
+              <a:rPr lang="en-US" dirty="0" err="1">
+                <a:solidFill>
+                  <a:schemeClr val="tx1"/>
+                </a:solidFill>
+              </a:rPr>
+              <a:t>untuk</a:t>
+            </a:r>
+            <a:r>
+              <a:rPr lang="en-US" dirty="0">
+                <a:solidFill>
+                  <a:schemeClr val="tx1"/>
+                </a:solidFill>
+              </a:rPr>
+              <a:t> </a:t>
+            </a:r>
+            <a:r>
+              <a:rPr lang="en-US" dirty="0" err="1">
+                <a:solidFill>
+                  <a:schemeClr val="tx1"/>
+                </a:solidFill>
+              </a:rPr>
+              <a:t>membuat</a:t>
+            </a:r>
+            <a:r>
+              <a:rPr lang="en-US" dirty="0">
+                <a:solidFill>
+                  <a:schemeClr val="tx1"/>
+                </a:solidFill>
+              </a:rPr>
+              <a:t> </a:t>
+            </a:r>
+            <a:r>
+              <a:rPr lang="en-US" dirty="0" err="1">
+                <a:solidFill>
+                  <a:schemeClr val="tx1"/>
+                </a:solidFill>
+              </a:rPr>
+              <a:t>grafik</a:t>
+            </a:r>
+            <a:r>
+              <a:rPr lang="en-US" dirty="0">
+                <a:solidFill>
+                  <a:schemeClr val="tx1"/>
+                </a:solidFill>
+              </a:rPr>
+              <a:t> </a:t>
+            </a:r>
+            <a:r>
+              <a:rPr lang="en-US" dirty="0" err="1">
+                <a:solidFill>
+                  <a:schemeClr val="tx1"/>
+                </a:solidFill>
+              </a:rPr>
+              <a:t>statistik</a:t>
+            </a:r>
+            <a:r>
+              <a:rPr lang="en-US" dirty="0">
+                <a:solidFill>
+                  <a:schemeClr val="tx1"/>
+                </a:solidFill>
+              </a:rPr>
+              <a:t> yang </a:t>
+            </a:r>
+            <a:r>
+              <a:rPr lang="en-US" dirty="0" err="1">
+                <a:solidFill>
+                  <a:schemeClr val="tx1"/>
+                </a:solidFill>
+              </a:rPr>
+              <a:t>menarik</a:t>
+            </a:r>
+            <a:r>
+              <a:rPr lang="en-US" dirty="0">
+                <a:solidFill>
+                  <a:schemeClr val="tx1"/>
+                </a:solidFill>
+              </a:rPr>
+              <a:t> dan </a:t>
+            </a:r>
+            <a:r>
+              <a:rPr lang="en-US" dirty="0" err="1">
+                <a:solidFill>
+                  <a:schemeClr val="tx1"/>
+                </a:solidFill>
+              </a:rPr>
+              <a:t>informatif</a:t>
+            </a:r>
+            <a:r>
+              <a:rPr lang="en-US" dirty="0">
+                <a:solidFill>
+                  <a:schemeClr val="tx1"/>
+                </a:solidFill>
+              </a:rPr>
+              <a:t> </a:t>
+            </a:r>
+            <a:r>
+              <a:rPr lang="en-US" dirty="0" err="1">
+                <a:solidFill>
+                  <a:schemeClr val="tx1"/>
+                </a:solidFill>
+              </a:rPr>
+              <a:t>dengan</a:t>
+            </a:r>
+            <a:r>
+              <a:rPr lang="en-US" dirty="0">
+                <a:solidFill>
+                  <a:schemeClr val="tx1"/>
+                </a:solidFill>
+              </a:rPr>
+              <a:t> Python. Hal </a:t>
+            </a:r>
+            <a:r>
+              <a:rPr lang="en-US" dirty="0" err="1">
+                <a:solidFill>
+                  <a:schemeClr val="tx1"/>
+                </a:solidFill>
+              </a:rPr>
+              <a:t>ini</a:t>
+            </a:r>
+            <a:r>
+              <a:rPr lang="en-US" dirty="0">
+                <a:solidFill>
+                  <a:schemeClr val="tx1"/>
+                </a:solidFill>
+              </a:rPr>
+              <a:t> </a:t>
+            </a:r>
+            <a:r>
+              <a:rPr lang="en-US" dirty="0" err="1">
+                <a:solidFill>
+                  <a:schemeClr val="tx1"/>
+                </a:solidFill>
+              </a:rPr>
+              <a:t>dibangun</a:t>
+            </a:r>
+            <a:r>
+              <a:rPr lang="en-US" dirty="0">
+                <a:solidFill>
+                  <a:schemeClr val="tx1"/>
+                </a:solidFill>
+              </a:rPr>
+              <a:t> di </a:t>
+            </a:r>
+            <a:r>
+              <a:rPr lang="en-US" dirty="0" err="1">
+                <a:solidFill>
+                  <a:schemeClr val="tx1"/>
+                </a:solidFill>
+              </a:rPr>
+              <a:t>atas</a:t>
+            </a:r>
+            <a:r>
+              <a:rPr lang="en-US" dirty="0">
+                <a:solidFill>
+                  <a:schemeClr val="tx1"/>
+                </a:solidFill>
+              </a:rPr>
+              <a:t> matplotlib dan </a:t>
+            </a:r>
+            <a:r>
+              <a:rPr lang="en-US" dirty="0" err="1">
+                <a:solidFill>
+                  <a:schemeClr val="tx1"/>
+                </a:solidFill>
+              </a:rPr>
+              <a:t>terintegrasi</a:t>
+            </a:r>
+            <a:r>
+              <a:rPr lang="en-US" dirty="0">
+                <a:solidFill>
+                  <a:schemeClr val="tx1"/>
+                </a:solidFill>
+              </a:rPr>
+              <a:t> </a:t>
+            </a:r>
+            <a:r>
+              <a:rPr lang="en-US" dirty="0" err="1">
+                <a:solidFill>
+                  <a:schemeClr val="tx1"/>
+                </a:solidFill>
+              </a:rPr>
+              <a:t>dengan</a:t>
+            </a:r>
+            <a:r>
+              <a:rPr lang="en-US" dirty="0">
+                <a:solidFill>
+                  <a:schemeClr val="tx1"/>
+                </a:solidFill>
+              </a:rPr>
+              <a:t> </a:t>
+            </a:r>
+            <a:r>
+              <a:rPr lang="en-US" dirty="0" err="1">
+                <a:solidFill>
+                  <a:schemeClr val="tx1"/>
+                </a:solidFill>
+              </a:rPr>
+              <a:t>Py</a:t>
+            </a:r>
+            <a:r>
+              <a:rPr lang="en-US" dirty="0">
+                <a:solidFill>
+                  <a:schemeClr val="tx1"/>
+                </a:solidFill>
+              </a:rPr>
+              <a:t> Data stack, </a:t>
+            </a:r>
+            <a:r>
+              <a:rPr lang="en-US" dirty="0" err="1">
+                <a:solidFill>
+                  <a:schemeClr val="tx1"/>
+                </a:solidFill>
+              </a:rPr>
+              <a:t>termasuk</a:t>
+            </a:r>
+            <a:r>
+              <a:rPr lang="en-US" dirty="0">
+                <a:solidFill>
+                  <a:schemeClr val="tx1"/>
+                </a:solidFill>
+              </a:rPr>
+              <a:t> </a:t>
+            </a:r>
+            <a:r>
+              <a:rPr lang="en-US" dirty="0" err="1">
+                <a:solidFill>
+                  <a:schemeClr val="tx1"/>
+                </a:solidFill>
+              </a:rPr>
+              <a:t>dukungan</a:t>
+            </a:r>
+            <a:r>
+              <a:rPr lang="en-US" dirty="0">
+                <a:solidFill>
+                  <a:schemeClr val="tx1"/>
+                </a:solidFill>
+              </a:rPr>
+              <a:t> </a:t>
+            </a:r>
+            <a:r>
+              <a:rPr lang="en-US" dirty="0" err="1">
+                <a:solidFill>
+                  <a:schemeClr val="tx1"/>
+                </a:solidFill>
+              </a:rPr>
+              <a:t>untuk</a:t>
+            </a:r>
+            <a:r>
+              <a:rPr lang="en-US" dirty="0">
+                <a:solidFill>
+                  <a:schemeClr val="tx1"/>
+                </a:solidFill>
+              </a:rPr>
+              <a:t> </a:t>
+            </a:r>
+            <a:r>
+              <a:rPr lang="en-US" dirty="0" err="1">
+                <a:solidFill>
+                  <a:schemeClr val="tx1"/>
+                </a:solidFill>
+              </a:rPr>
+              <a:t>numpy</a:t>
+            </a:r>
+            <a:r>
+              <a:rPr lang="en-US" dirty="0">
+                <a:solidFill>
+                  <a:schemeClr val="tx1"/>
+                </a:solidFill>
+              </a:rPr>
+              <a:t> dan data panda </a:t>
+            </a:r>
+            <a:r>
+              <a:rPr lang="en-US" dirty="0" err="1">
+                <a:solidFill>
+                  <a:schemeClr val="tx1"/>
+                </a:solidFill>
+              </a:rPr>
+              <a:t>struktur</a:t>
+            </a:r>
+            <a:r>
+              <a:rPr lang="en-US" dirty="0">
+                <a:solidFill>
+                  <a:schemeClr val="tx1"/>
+                </a:solidFill>
+              </a:rPr>
+              <a:t> dan </a:t>
+            </a:r>
+            <a:r>
+              <a:rPr lang="en-US" dirty="0" err="1">
+                <a:solidFill>
+                  <a:schemeClr val="tx1"/>
+                </a:solidFill>
+              </a:rPr>
+              <a:t>rutinitas</a:t>
+            </a:r>
+            <a:r>
+              <a:rPr lang="en-US" dirty="0">
+                <a:solidFill>
+                  <a:schemeClr val="tx1"/>
+                </a:solidFill>
+              </a:rPr>
+              <a:t> </a:t>
+            </a:r>
+            <a:r>
+              <a:rPr lang="en-US" dirty="0" err="1">
+                <a:solidFill>
+                  <a:schemeClr val="tx1"/>
+                </a:solidFill>
+              </a:rPr>
+              <a:t>statistik</a:t>
+            </a:r>
+            <a:r>
+              <a:rPr lang="en-US" dirty="0">
+                <a:solidFill>
+                  <a:schemeClr val="tx1"/>
+                </a:solidFill>
+              </a:rPr>
+              <a:t> </a:t>
+            </a:r>
+            <a:r>
+              <a:rPr lang="en-US" dirty="0" err="1">
+                <a:solidFill>
+                  <a:schemeClr val="tx1"/>
+                </a:solidFill>
+              </a:rPr>
+              <a:t>dari</a:t>
+            </a:r>
+            <a:r>
+              <a:rPr lang="en-US" dirty="0">
+                <a:solidFill>
+                  <a:schemeClr val="tx1"/>
+                </a:solidFill>
+              </a:rPr>
+              <a:t> </a:t>
+            </a:r>
+            <a:r>
+              <a:rPr lang="en-US" dirty="0" err="1">
+                <a:solidFill>
+                  <a:schemeClr val="tx1"/>
+                </a:solidFill>
+              </a:rPr>
+              <a:t>scipy</a:t>
+            </a:r>
+            <a:r>
+              <a:rPr lang="en-US" dirty="0">
+                <a:solidFill>
+                  <a:schemeClr val="tx1"/>
+                </a:solidFill>
+              </a:rPr>
+              <a:t> dan stats models</a:t>
+            </a:r>
+          </a:p>
+        </p:txBody>
+      </p:sp>
+    </p:spTree>
+    <p:extLst>
+      <p:ext uri="{BB962C8B-B14F-4D97-AF65-F5344CB8AC3E}">
+        <p14:creationId xmlns:p14="http://schemas.microsoft.com/office/powerpoint/2010/main" val="1447720284"/>
+      </p:ext>
+    </p:extLst>
+  </p:cSld>
+  <p:clrMapOvr>
+    <a:masterClrMapping/>
+  </p:clrMapOvr>
+</p:sld>
+</file>
+
+<file path=ppt/slides/slide33.xml><?xml version="1.0" encoding="utf-8"?>
+<p:sld xmlns:a="http://schemas.openxmlformats.org/drawingml/2006/main" xmlns:r="http://schemas.openxmlformats.org/officeDocument/2006/relationships" xmlns:p="http://schemas.openxmlformats.org/presentationml/2006/main">
+  <p:cSld>
+    <p:spTree>
+      <p:nvGrpSpPr>
+        <p:cNvPr id="1" name=""/>
+        <p:cNvGrpSpPr/>
+        <p:nvPr/>
+      </p:nvGrpSpPr>
+      <p:grpSpPr>
+        <a:xfrm>
+          <a:off x="0" y="0"/>
+          <a:ext cx="0" cy="0"/>
+          <a:chOff x="0" y="0"/>
+          <a:chExt cx="0" cy="0"/>
+        </a:xfrm>
+      </p:grpSpPr>
+      <p:sp>
+        <p:nvSpPr>
+          <p:cNvPr id="3" name="Tampungan Teks 2">
+            <a:extLst>
+              <a:ext uri="{FF2B5EF4-FFF2-40B4-BE49-F238E27FC236}">
+                <a16:creationId xmlns:a16="http://schemas.microsoft.com/office/drawing/2014/main" id="{6EA0CB21-4BA3-4926-90F0-4481067051A6}"/>
+              </a:ext>
+            </a:extLst>
+          </p:cNvPr>
+          <p:cNvSpPr>
+            <a:spLocks noGrp="1"/>
+          </p:cNvSpPr>
+          <p:nvPr>
+            <p:ph type="body" idx="1"/>
+          </p:nvPr>
+        </p:nvSpPr>
+        <p:spPr>
+          <a:xfrm>
+            <a:off x="2589210" y="1527380"/>
+            <a:ext cx="8915399" cy="613719"/>
+          </a:xfrm>
+        </p:spPr>
+        <p:txBody>
+          <a:bodyPr/>
+          <a:lstStyle/>
+          <a:p>
+            <a:endParaRPr lang="en-US" b="1" dirty="0"/>
+          </a:p>
+        </p:txBody>
+      </p:sp>
+      <p:pic>
+        <p:nvPicPr>
+          <p:cNvPr id="4" name="Gambar 3">
+            <a:extLst>
+              <a:ext uri="{FF2B5EF4-FFF2-40B4-BE49-F238E27FC236}">
+                <a16:creationId xmlns:a16="http://schemas.microsoft.com/office/drawing/2014/main" id="{1B22424B-A1C9-4715-BC92-07ED136A49AF}"/>
+              </a:ext>
+            </a:extLst>
+          </p:cNvPr>
+          <p:cNvPicPr/>
+          <p:nvPr/>
+        </p:nvPicPr>
+        <p:blipFill>
+          <a:blip r:embed="rId2"/>
+          <a:stretch>
+            <a:fillRect/>
+          </a:stretch>
+        </p:blipFill>
+        <p:spPr>
+          <a:xfrm>
+            <a:off x="2589210" y="2337077"/>
+            <a:ext cx="8915399" cy="4520923"/>
+          </a:xfrm>
+          <a:prstGeom prst="rect">
+            <a:avLst/>
+          </a:prstGeom>
+        </p:spPr>
+      </p:pic>
+      <p:sp>
+        <p:nvSpPr>
+          <p:cNvPr id="5" name="Judul 1">
+            <a:extLst>
+              <a:ext uri="{FF2B5EF4-FFF2-40B4-BE49-F238E27FC236}">
+                <a16:creationId xmlns:a16="http://schemas.microsoft.com/office/drawing/2014/main" id="{D06DF7B6-7B2E-4286-B67C-3FAF356733F6}"/>
+              </a:ext>
+            </a:extLst>
+          </p:cNvPr>
+          <p:cNvSpPr>
+            <a:spLocks noGrp="1"/>
+          </p:cNvSpPr>
+          <p:nvPr>
+            <p:ph type="title"/>
+          </p:nvPr>
+        </p:nvSpPr>
+        <p:spPr>
+          <a:xfrm>
+            <a:off x="2589208" y="696097"/>
+            <a:ext cx="8915399" cy="613719"/>
+          </a:xfrm>
+        </p:spPr>
+        <p:txBody>
+          <a:bodyPr>
+            <a:noAutofit/>
+          </a:bodyPr>
+          <a:lstStyle/>
+          <a:p>
+            <a:r>
+              <a:rPr lang="id-ID" sz="4300" b="1" dirty="0"/>
+              <a:t>Instalasi </a:t>
+            </a:r>
+            <a:r>
+              <a:rPr lang="id-ID" sz="4300" b="1" dirty="0" err="1"/>
+              <a:t>Seaborn</a:t>
+            </a:r>
+            <a:r>
+              <a:rPr lang="id-ID" sz="4300" b="1" dirty="0"/>
+              <a:t> Pada </a:t>
+            </a:r>
+            <a:r>
+              <a:rPr lang="id-ID" sz="4300" b="1" dirty="0" err="1"/>
+              <a:t>Pyhton</a:t>
+            </a:r>
+            <a:endParaRPr lang="en-US" sz="4300" b="1" dirty="0"/>
+          </a:p>
+        </p:txBody>
+      </p:sp>
+    </p:spTree>
+    <p:extLst>
+      <p:ext uri="{BB962C8B-B14F-4D97-AF65-F5344CB8AC3E}">
+        <p14:creationId xmlns:p14="http://schemas.microsoft.com/office/powerpoint/2010/main" val="227356613"/>
+      </p:ext>
+    </p:extLst>
+  </p:cSld>
+  <p:clrMapOvr>
+    <a:masterClrMapping/>
+  </p:clrMapOvr>
+</p:sld>
+</file>
+
+<file path=ppt/slides/slide34.xml><?xml version="1.0" encoding="utf-8"?>
+<p:sld xmlns:a="http://schemas.openxmlformats.org/drawingml/2006/main" xmlns:r="http://schemas.openxmlformats.org/officeDocument/2006/relationships" xmlns:p="http://schemas.openxmlformats.org/presentationml/2006/main">
+  <p:cSld>
+    <p:spTree>
+      <p:nvGrpSpPr>
+        <p:cNvPr id="1" name=""/>
+        <p:cNvGrpSpPr/>
+        <p:nvPr/>
+      </p:nvGrpSpPr>
+      <p:grpSpPr>
+        <a:xfrm>
+          <a:off x="0" y="0"/>
+          <a:ext cx="0" cy="0"/>
+          <a:chOff x="0" y="0"/>
+          <a:chExt cx="0" cy="0"/>
+        </a:xfrm>
+      </p:grpSpPr>
+      <p:sp>
+        <p:nvSpPr>
+          <p:cNvPr id="3" name="Tampungan Teks 2">
+            <a:extLst>
+              <a:ext uri="{FF2B5EF4-FFF2-40B4-BE49-F238E27FC236}">
+                <a16:creationId xmlns:a16="http://schemas.microsoft.com/office/drawing/2014/main" id="{1D9EF853-2C68-463B-BEE7-0AA7CC78D843}"/>
+              </a:ext>
+            </a:extLst>
+          </p:cNvPr>
+          <p:cNvSpPr>
+            <a:spLocks noGrp="1"/>
+          </p:cNvSpPr>
+          <p:nvPr>
+            <p:ph type="body" idx="1"/>
+          </p:nvPr>
+        </p:nvSpPr>
+        <p:spPr>
+          <a:xfrm>
+            <a:off x="2589212" y="198783"/>
+            <a:ext cx="8915399" cy="6520069"/>
+          </a:xfrm>
+        </p:spPr>
+        <p:txBody>
+          <a:bodyPr>
+            <a:normAutofit fontScale="92500" lnSpcReduction="20000"/>
+          </a:bodyPr>
+          <a:lstStyle/>
+          <a:p>
+            <a:r>
+              <a:rPr lang="id-ID" dirty="0"/>
+              <a:t>Sumber :</a:t>
+            </a:r>
+          </a:p>
+          <a:p>
+            <a:endParaRPr lang="id-ID" dirty="0"/>
+          </a:p>
+          <a:p>
+            <a:r>
+              <a:rPr lang="en-US" dirty="0">
+                <a:hlinkClick r:id="rId2"/>
+              </a:rPr>
+              <a:t>https://www.duniailkom.com/tutorial-belajar-bahasa-pemrograman-python-untuk-pemula/</a:t>
+            </a:r>
+            <a:endParaRPr lang="id-ID" dirty="0"/>
+          </a:p>
+          <a:p>
+            <a:endParaRPr lang="id-ID" dirty="0"/>
+          </a:p>
+          <a:p>
+            <a:r>
+              <a:rPr lang="en-US" dirty="0">
+                <a:hlinkClick r:id="rId3"/>
+              </a:rPr>
+              <a:t>https://www.petanikode.com/tutorial/python/</a:t>
+            </a:r>
+            <a:endParaRPr lang="id-ID" dirty="0"/>
+          </a:p>
+          <a:p>
+            <a:endParaRPr lang="id-ID" dirty="0"/>
+          </a:p>
+          <a:p>
+            <a:r>
+              <a:rPr lang="en-US" dirty="0">
+                <a:hlinkClick r:id="rId4"/>
+              </a:rPr>
+              <a:t>https://www.abiraf.com/blog/modules-python-yang-wajib-dimiliki---virtualenv-dan-pip</a:t>
+            </a:r>
+            <a:endParaRPr lang="id-ID" dirty="0"/>
+          </a:p>
+          <a:p>
+            <a:endParaRPr lang="id-ID" dirty="0"/>
+          </a:p>
+          <a:p>
+            <a:r>
+              <a:rPr lang="en-US" dirty="0">
+                <a:hlinkClick r:id="rId5"/>
+              </a:rPr>
+              <a:t>https://stackoverflow.com/questions/4016151/how-to-use-pythons-easy-install-on-windows-its-not-so-easy</a:t>
+            </a:r>
+            <a:endParaRPr lang="id-ID" dirty="0"/>
+          </a:p>
+          <a:p>
+            <a:endParaRPr lang="id-ID" dirty="0"/>
+          </a:p>
+          <a:p>
+            <a:r>
+              <a:rPr lang="en-US" dirty="0">
+                <a:hlinkClick r:id="rId6"/>
+              </a:rPr>
+              <a:t>https://setuptools.readthedocs.io/en/latest/easy_install.html</a:t>
+            </a:r>
+            <a:endParaRPr lang="id-ID" dirty="0"/>
+          </a:p>
+          <a:p>
+            <a:endParaRPr lang="id-ID" dirty="0"/>
+          </a:p>
+          <a:p>
+            <a:r>
+              <a:rPr lang="en-US" dirty="0">
+                <a:hlinkClick r:id="rId7"/>
+              </a:rPr>
+              <a:t>https://www.codepolitan.com/interactive-coding/python</a:t>
+            </a:r>
+            <a:endParaRPr lang="id-ID" dirty="0"/>
+          </a:p>
+          <a:p>
+            <a:endParaRPr lang="id-ID" dirty="0"/>
+          </a:p>
+          <a:p>
+            <a:r>
+              <a:rPr lang="en-US" dirty="0">
+                <a:hlinkClick r:id="rId8"/>
+              </a:rPr>
+              <a:t>https://belajarpython.com/</a:t>
+            </a:r>
+            <a:endParaRPr lang="id-ID" dirty="0"/>
+          </a:p>
+          <a:p>
+            <a:endParaRPr lang="id-ID" dirty="0"/>
+          </a:p>
+        </p:txBody>
+      </p:sp>
+    </p:spTree>
+    <p:extLst>
+      <p:ext uri="{BB962C8B-B14F-4D97-AF65-F5344CB8AC3E}">
+        <p14:creationId xmlns:p14="http://schemas.microsoft.com/office/powerpoint/2010/main" val="3826324166"/>
+      </p:ext>
+    </p:extLst>
+  </p:cSld>
+  <p:clrMapOvr>
+    <a:masterClrMapping/>
+  </p:clrMapOvr>
+</p:sld>
+</file>
+
+<file path=ppt/slides/slide35.xml><?xml version="1.0" encoding="utf-8"?>
+<p:sld xmlns:a="http://schemas.openxmlformats.org/drawingml/2006/main" xmlns:r="http://schemas.openxmlformats.org/officeDocument/2006/relationships" xmlns:p="http://schemas.openxmlformats.org/presentationml/2006/main">
+  <p:cSld>
+    <p:spTree>
+      <p:nvGrpSpPr>
+        <p:cNvPr id="1" name=""/>
+        <p:cNvGrpSpPr/>
+        <p:nvPr/>
+      </p:nvGrpSpPr>
+      <p:grpSpPr>
+        <a:xfrm>
+          <a:off x="0" y="0"/>
+          <a:ext cx="0" cy="0"/>
+          <a:chOff x="0" y="0"/>
+          <a:chExt cx="0" cy="0"/>
+        </a:xfrm>
+      </p:grpSpPr>
+      <p:sp>
+        <p:nvSpPr>
           <p:cNvPr id="2" name="Title 1">
             <a:extLst>
               <a:ext uri="{FF2B5EF4-FFF2-40B4-BE49-F238E27FC236}">
@@ -11567,36 +13727,75 @@
           <a:lstStyle/>
           <a:p>
             <a:r>
-              <a:rPr lang="en-US" dirty="0"/>
+              <a:rPr lang="en-US" dirty="0">
+                <a:solidFill>
+                  <a:srgbClr val="FF0000"/>
+                </a:solidFill>
+              </a:rPr>
               <a:t>https://belajarpython.com/tutorial/tipe-data-python</a:t>
             </a:r>
           </a:p>
           <a:p>
             <a:r>
-              <a:rPr lang="en-US" dirty="0"/>
+              <a:rPr lang="en-US" dirty="0">
+                <a:solidFill>
+                  <a:srgbClr val="FF0000"/>
+                </a:solidFill>
+              </a:rPr>
               <a:t>https://realpython.com/installing-python/</a:t>
             </a:r>
           </a:p>
           <a:p>
             <a:r>
-              <a:rPr lang="en-US" dirty="0"/>
+              <a:rPr lang="en-US" dirty="0">
+                <a:solidFill>
+                  <a:srgbClr val="FF0000"/>
+                </a:solidFill>
+              </a:rPr>
               <a:t>https://www.google.com/search?safe=strict&amp;biw=1366&amp;bih=663&amp;tbm=isch&amp;sa=1&amp;ei=zbeTXI_WIbSYmge0xb74DA&amp;q=pip+instal</a:t>
             </a:r>
           </a:p>
           <a:p>
             <a:r>
-              <a:rPr lang="en-US" dirty="0"/>
+              <a:rPr lang="en-US" dirty="0">
+                <a:solidFill>
+                  <a:srgbClr val="FF0000"/>
+                </a:solidFill>
+              </a:rPr>
               <a:t>https://www.youtube.com/watch?v=zPMr0lEMqpo</a:t>
             </a:r>
           </a:p>
           <a:p>
             <a:r>
               <a:rPr lang="en-US" dirty="0">
-                <a:hlinkClick r:id="rId2"/>
+                <a:solidFill>
+                  <a:srgbClr val="FF0000"/>
+                </a:solidFill>
+                <a:hlinkClick r:id="rId2">
+                  <a:extLst>
+                    <a:ext uri="{A12FA001-AC4F-418D-AE19-62706E023703}">
+                      <ahyp:hlinkClr xmlns:ahyp="http://schemas.microsoft.com/office/drawing/2018/hyperlinkcolor" val="tx"/>
+                    </a:ext>
+                  </a:extLst>
+                </a:hlinkClick>
               </a:rPr>
               <a:t>https://www.youtube.com/watch?v=dRWleqAdyW0</a:t>
             </a:r>
-            <a:endParaRPr lang="en-US" dirty="0"/>
+            <a:endParaRPr lang="id-ID" dirty="0">
+              <a:solidFill>
+                <a:srgbClr val="FF0000"/>
+              </a:solidFill>
+            </a:endParaRPr>
+          </a:p>
+          <a:p>
+            <a:r>
+              <a:rPr lang="id-ID" dirty="0">
+                <a:solidFill>
+                  <a:srgbClr val="FF0000"/>
+                </a:solidFill>
+              </a:rPr>
+              <a:t>https://github.com/RizkyNugraha46/Pengantar-Deep-Learning</a:t>
+            </a:r>
           </a:p>
           <a:p>
             <a:endParaRPr lang="en-US" dirty="0"/>
@@ -11615,11 +13814,17 @@
           <p:cNvGraphicFramePr>
             <a:graphicFrameLocks noGrp="1"/>
           </p:cNvGraphicFramePr>
-          <p:nvPr/>
+          <p:nvPr>
+            <p:extLst>
+              <p:ext uri="{D42A27DB-BD31-4B8C-83A1-F6EECF244321}">
+                <p14:modId xmlns:p14="http://schemas.microsoft.com/office/powerpoint/2010/main" val="4183551184"/>
+              </p:ext>
+            </p:extLst>
+          </p:nvPr>
         </p:nvGraphicFramePr>
         <p:xfrm>
           <a:off x="685800" y="3536632"/>
-          <a:ext cx="10396538" cy="365760"/>
+          <a:ext cx="10396538" cy="817889"/>
         </p:xfrm>
         <a:graphic>
           <a:graphicData uri="http://schemas.openxmlformats.org/drawingml/2006/table">
@@ -11634,7 +13839,7 @@
                   </a:extLst>
                 </a:gridCol>
               </a:tblGrid>
-              <a:tr h="0">
+              <a:tr h="817889">
                 <a:tc>
                   <a:txBody>
                     <a:bodyPr/>
@@ -11688,130 +13893,6 @@
     <p:extLst>
       <p:ext uri="{BB962C8B-B14F-4D97-AF65-F5344CB8AC3E}">
         <p14:creationId xmlns:p14="http://schemas.microsoft.com/office/powerpoint/2010/main" val="3008689921"/>
-      </p:ext>
-    </p:extLst>
-  </p:cSld>
-  <p:clrMapOvr>
-    <a:masterClrMapping/>
-  </p:clrMapOvr>
-</p:sld>
-</file>
-
-<file path=ppt/slides/slide3.xml><?xml version="1.0" encoding="utf-8"?>
-<p:sld xmlns:a="http://schemas.openxmlformats.org/drawingml/2006/main" xmlns:r="http://schemas.openxmlformats.org/officeDocument/2006/relationships" xmlns:p="http://schemas.openxmlformats.org/presentationml/2006/main">
-  <p:cSld>
-    <p:spTree>
-      <p:nvGrpSpPr>
-        <p:cNvPr id="1" name=""/>
-        <p:cNvGrpSpPr/>
-        <p:nvPr/>
-      </p:nvGrpSpPr>
-      <p:grpSpPr>
-        <a:xfrm>
-          <a:off x="0" y="0"/>
-          <a:ext cx="0" cy="0"/>
-          <a:chOff x="0" y="0"/>
-          <a:chExt cx="0" cy="0"/>
-        </a:xfrm>
-      </p:grpSpPr>
-      <p:sp>
-        <p:nvSpPr>
-          <p:cNvPr id="2" name="Title 1">
-            <a:extLst>
-              <a:ext uri="{FF2B5EF4-FFF2-40B4-BE49-F238E27FC236}">
-                <a16:creationId xmlns:a16="http://schemas.microsoft.com/office/drawing/2014/main" id="{E032B052-9AB9-479B-B9CC-8BDFDF47E40C}"/>
-              </a:ext>
-            </a:extLst>
-          </p:cNvPr>
-          <p:cNvSpPr>
-            <a:spLocks noGrp="1"/>
-          </p:cNvSpPr>
-          <p:nvPr>
-            <p:ph type="title"/>
-          </p:nvPr>
-        </p:nvSpPr>
-        <p:spPr/>
-        <p:txBody>
-          <a:bodyPr/>
-          <a:lstStyle/>
-          <a:p>
-            <a:pPr algn="ctr"/>
-            <a:r>
-              <a:rPr lang="en-US" dirty="0"/>
-              <a:t>package MANAGER (</a:t>
-            </a:r>
-            <a:r>
-              <a:rPr lang="en-US" dirty="0" err="1"/>
-              <a:t>instalasi</a:t>
-            </a:r>
-            <a:r>
-              <a:rPr lang="en-US" dirty="0"/>
-              <a:t>)</a:t>
-            </a:r>
-          </a:p>
-        </p:txBody>
-      </p:sp>
-      <p:sp>
-        <p:nvSpPr>
-          <p:cNvPr id="4" name="Content Placeholder 3">
-            <a:extLst>
-              <a:ext uri="{FF2B5EF4-FFF2-40B4-BE49-F238E27FC236}">
-                <a16:creationId xmlns:a16="http://schemas.microsoft.com/office/drawing/2014/main" id="{DE6F0A50-415D-4E41-B51A-EE7F37B749D4}"/>
-              </a:ext>
-            </a:extLst>
-          </p:cNvPr>
-          <p:cNvSpPr>
-            <a:spLocks noGrp="1"/>
-          </p:cNvSpPr>
-          <p:nvPr>
-            <p:ph sz="half" idx="1"/>
-          </p:nvPr>
-        </p:nvSpPr>
-        <p:spPr/>
-        <p:txBody>
-          <a:bodyPr/>
-          <a:lstStyle/>
-          <a:p>
-            <a:endParaRPr lang="en-US"/>
-          </a:p>
-        </p:txBody>
-      </p:sp>
-      <p:pic>
-        <p:nvPicPr>
-          <p:cNvPr id="6" name="Content Placeholder 5">
-            <a:extLst>
-              <a:ext uri="{FF2B5EF4-FFF2-40B4-BE49-F238E27FC236}">
-                <a16:creationId xmlns:a16="http://schemas.microsoft.com/office/drawing/2014/main" id="{0CFEC6E1-C846-4CE0-9B18-CAD7F70A983B}"/>
-              </a:ext>
-            </a:extLst>
-          </p:cNvPr>
-          <p:cNvPicPr>
-            <a:picLocks noGrp="1" noChangeAspect="1"/>
-          </p:cNvPicPr>
-          <p:nvPr>
-            <p:ph sz="half" idx="2"/>
-          </p:nvPr>
-        </p:nvPicPr>
-        <p:blipFill>
-          <a:blip r:embed="rId2"/>
-          <a:stretch>
-            <a:fillRect/>
-          </a:stretch>
-        </p:blipFill>
-        <p:spPr>
-          <a:xfrm>
-            <a:off x="3447288" y="2535918"/>
-            <a:ext cx="4591050" cy="2771775"/>
-          </a:xfrm>
-          <a:prstGeom prst="rect">
-            <a:avLst/>
-          </a:prstGeom>
-        </p:spPr>
-      </p:pic>
-    </p:spTree>
-    <p:extLst>
-      <p:ext uri="{BB962C8B-B14F-4D97-AF65-F5344CB8AC3E}">
-        <p14:creationId xmlns:p14="http://schemas.microsoft.com/office/powerpoint/2010/main" val="354257116"/>
       </p:ext>
     </p:extLst>
   </p:cSld>

</xml_diff>